<commit_message>
docs: actualizar algo del pptx
</commit_message>
<xml_diff>
--- a/docs/pptx-primeraentrega.pptx
+++ b/docs/pptx-primeraentrega.pptx
@@ -22,23 +22,29 @@
     <p:sldId id="267" r:id="rId17"/>
     <p:sldId id="268" r:id="rId18"/>
     <p:sldId id="269" r:id="rId19"/>
+    <p:sldId id="270" r:id="rId20"/>
+    <p:sldId id="271" r:id="rId21"/>
+    <p:sldId id="272" r:id="rId22"/>
+    <p:sldId id="273" r:id="rId23"/>
+    <p:sldId id="274" r:id="rId24"/>
+    <p:sldId id="275" r:id="rId25"/>
   </p:sldIdLst>
   <p:sldSz cy="5143500" cx="9144000"/>
   <p:notesSz cx="6858000" cy="9144000"/>
   <p:embeddedFontLst>
     <p:embeddedFont>
       <p:font typeface="Economica"/>
-      <p:regular r:id="rId20"/>
-      <p:bold r:id="rId21"/>
-      <p:italic r:id="rId22"/>
-      <p:boldItalic r:id="rId23"/>
+      <p:regular r:id="rId26"/>
+      <p:bold r:id="rId27"/>
+      <p:italic r:id="rId28"/>
+      <p:boldItalic r:id="rId29"/>
     </p:embeddedFont>
     <p:embeddedFont>
       <p:font typeface="Open Sans"/>
-      <p:regular r:id="rId24"/>
-      <p:bold r:id="rId25"/>
-      <p:italic r:id="rId26"/>
-      <p:boldItalic r:id="rId27"/>
+      <p:regular r:id="rId30"/>
+      <p:bold r:id="rId31"/>
+      <p:italic r:id="rId32"/>
+      <p:boldItalic r:id="rId33"/>
     </p:embeddedFont>
   </p:embeddedFontLst>
   <p:defaultTextStyle>
@@ -819,7 +825,7 @@
   <p:cSld>
     <p:spTree>
       <p:nvGrpSpPr>
-        <p:cNvPr id="120" name="Shape 120"/>
+        <p:cNvPr id="119" name="Shape 119"/>
         <p:cNvGrpSpPr/>
         <p:nvPr/>
       </p:nvGrpSpPr>
@@ -833,7 +839,7 @@
       </p:grpSpPr>
       <p:sp>
         <p:nvSpPr>
-          <p:cNvPr id="121" name="Google Shape;121;g37eaed4b55a_0_14:notes"/>
+          <p:cNvPr id="120" name="Google Shape;120;g37eaed4b55a_0_21:notes"/>
           <p:cNvSpPr/>
           <p:nvPr>
             <p:ph idx="2" type="sldImg"/>
@@ -868,7 +874,7 @@
       </p:sp>
       <p:sp>
         <p:nvSpPr>
-          <p:cNvPr id="122" name="Google Shape;122;g37eaed4b55a_0_14:notes"/>
+          <p:cNvPr id="121" name="Google Shape;121;g37eaed4b55a_0_21:notes"/>
           <p:cNvSpPr txBox="1"/>
           <p:nvPr>
             <p:ph idx="1" type="body"/>
@@ -918,7 +924,7 @@
   <p:cSld>
     <p:spTree>
       <p:nvGrpSpPr>
-        <p:cNvPr id="127" name="Shape 127"/>
+        <p:cNvPr id="125" name="Shape 125"/>
         <p:cNvGrpSpPr/>
         <p:nvPr/>
       </p:nvGrpSpPr>
@@ -932,7 +938,7 @@
       </p:grpSpPr>
       <p:sp>
         <p:nvSpPr>
-          <p:cNvPr id="128" name="Google Shape;128;g37e297f581d_2_6:notes"/>
+          <p:cNvPr id="126" name="Google Shape;126;g3803d3b2b91_0_8:notes"/>
           <p:cNvSpPr/>
           <p:nvPr>
             <p:ph idx="2" type="sldImg"/>
@@ -967,7 +973,7 @@
       </p:sp>
       <p:sp>
         <p:nvSpPr>
-          <p:cNvPr id="129" name="Google Shape;129;g37e297f581d_2_6:notes"/>
+          <p:cNvPr id="127" name="Google Shape;127;g3803d3b2b91_0_8:notes"/>
           <p:cNvSpPr txBox="1"/>
           <p:nvPr>
             <p:ph idx="1" type="body"/>
@@ -1017,7 +1023,7 @@
   <p:cSld>
     <p:spTree>
       <p:nvGrpSpPr>
-        <p:cNvPr id="133" name="Shape 133"/>
+        <p:cNvPr id="132" name="Shape 132"/>
         <p:cNvGrpSpPr/>
         <p:nvPr/>
       </p:nvGrpSpPr>
@@ -1031,7 +1037,7 @@
       </p:grpSpPr>
       <p:sp>
         <p:nvSpPr>
-          <p:cNvPr id="134" name="Google Shape;134;g37e297f581d_0_10:notes"/>
+          <p:cNvPr id="133" name="Google Shape;133;g37eaed4b55a_0_14:notes"/>
           <p:cNvSpPr/>
           <p:nvPr>
             <p:ph idx="2" type="sldImg"/>
@@ -1066,7 +1072,7 @@
       </p:sp>
       <p:sp>
         <p:nvSpPr>
-          <p:cNvPr id="135" name="Google Shape;135;g37e297f581d_0_10:notes"/>
+          <p:cNvPr id="134" name="Google Shape;134;g37eaed4b55a_0_14:notes"/>
           <p:cNvSpPr txBox="1"/>
           <p:nvPr>
             <p:ph idx="1" type="body"/>
@@ -1130,7 +1136,7 @@
       </p:grpSpPr>
       <p:sp>
         <p:nvSpPr>
-          <p:cNvPr id="140" name="Google Shape;140;g37e297f581d_0_15:notes"/>
+          <p:cNvPr id="140" name="Google Shape;140;g3803d3b2b91_0_16:notes"/>
           <p:cNvSpPr/>
           <p:nvPr>
             <p:ph idx="2" type="sldImg"/>
@@ -1165,7 +1171,7 @@
       </p:sp>
       <p:sp>
         <p:nvSpPr>
-          <p:cNvPr id="141" name="Google Shape;141;g37e297f581d_0_15:notes"/>
+          <p:cNvPr id="141" name="Google Shape;141;g3803d3b2b91_0_16:notes"/>
           <p:cNvSpPr txBox="1"/>
           <p:nvPr>
             <p:ph idx="1" type="body"/>
@@ -1229,7 +1235,7 @@
       </p:grpSpPr>
       <p:sp>
         <p:nvSpPr>
-          <p:cNvPr id="146" name="Google Shape;146;g37e297f581d_2_14:notes"/>
+          <p:cNvPr id="146" name="Google Shape;146;g3803d3b2b91_0_22:notes"/>
           <p:cNvSpPr/>
           <p:nvPr>
             <p:ph idx="2" type="sldImg"/>
@@ -1264,7 +1270,502 @@
       </p:sp>
       <p:sp>
         <p:nvSpPr>
-          <p:cNvPr id="147" name="Google Shape;147;g37e297f581d_2_14:notes"/>
+          <p:cNvPr id="147" name="Google Shape;147;g3803d3b2b91_0_22:notes"/>
+          <p:cNvSpPr txBox="1"/>
+          <p:nvPr>
+            <p:ph idx="1" type="body"/>
+          </p:nvPr>
+        </p:nvSpPr>
+        <p:spPr>
+          <a:xfrm>
+            <a:off x="685800" y="4343400"/>
+            <a:ext cx="5486400" cy="4114800"/>
+          </a:xfrm>
+          <a:prstGeom prst="rect">
+            <a:avLst/>
+          </a:prstGeom>
+        </p:spPr>
+        <p:txBody>
+          <a:bodyPr anchorCtr="0" anchor="t" bIns="91425" lIns="91425" spcFirstLastPara="1" rIns="91425" wrap="square" tIns="91425">
+            <a:noAutofit/>
+          </a:bodyPr>
+          <a:lstStyle/>
+          <a:p>
+            <a:pPr indent="0" lvl="0" marL="0" rtl="0" algn="l">
+              <a:spcBef>
+                <a:spcPts val="0"/>
+              </a:spcBef>
+              <a:spcAft>
+                <a:spcPts val="0"/>
+              </a:spcAft>
+              <a:buNone/>
+            </a:pPr>
+            <a:r>
+              <a:t/>
+            </a:r>
+            <a:endParaRPr/>
+          </a:p>
+        </p:txBody>
+      </p:sp>
+    </p:spTree>
+  </p:cSld>
+  <p:clrMapOvr>
+    <a:masterClrMapping/>
+  </p:clrMapOvr>
+</p:notes>
+</file>
+
+<file path=ppt/notesSlides/notesSlide15.xml><?xml version="1.0" encoding="utf-8"?>
+<p:notes xmlns:a="http://schemas.openxmlformats.org/drawingml/2006/main" xmlns:r="http://schemas.openxmlformats.org/officeDocument/2006/relationships" xmlns:mc="http://schemas.openxmlformats.org/markup-compatibility/2006" xmlns:mv="urn:schemas-microsoft-com:mac:vml" xmlns:p="http://schemas.openxmlformats.org/presentationml/2006/main" xmlns:c="http://schemas.openxmlformats.org/drawingml/2006/chart" xmlns:dgm="http://schemas.openxmlformats.org/drawingml/2006/diagram" xmlns:o="urn:schemas-microsoft-com:office:office" xmlns:v="urn:schemas-microsoft-com:vml" xmlns:pvml="urn:schemas-microsoft-com:office:powerpoint" xmlns:com="http://schemas.openxmlformats.org/drawingml/2006/compatibility" xmlns:p14="http://schemas.microsoft.com/office/powerpoint/2010/main" xmlns:p15="http://schemas.microsoft.com/office/powerpoint/2012/main" xmlns:ahyp="http://schemas.microsoft.com/office/drawing/2018/hyperlinkcolor" showMasterPhAnim="0" showMasterSp="0">
+  <p:cSld>
+    <p:spTree>
+      <p:nvGrpSpPr>
+        <p:cNvPr id="151" name="Shape 151"/>
+        <p:cNvGrpSpPr/>
+        <p:nvPr/>
+      </p:nvGrpSpPr>
+      <p:grpSpPr>
+        <a:xfrm>
+          <a:off x="0" y="0"/>
+          <a:ext cx="0" cy="0"/>
+          <a:chOff x="0" y="0"/>
+          <a:chExt cx="0" cy="0"/>
+        </a:xfrm>
+      </p:grpSpPr>
+      <p:sp>
+        <p:nvSpPr>
+          <p:cNvPr id="152" name="Google Shape;152;g3803d3b2b91_0_27:notes"/>
+          <p:cNvSpPr/>
+          <p:nvPr>
+            <p:ph idx="2" type="sldImg"/>
+          </p:nvPr>
+        </p:nvSpPr>
+        <p:spPr>
+          <a:xfrm>
+            <a:off x="381300" y="685800"/>
+            <a:ext cx="6096000" cy="3429000"/>
+          </a:xfrm>
+          <a:custGeom>
+            <a:rect b="b" l="l" r="r" t="t"/>
+            <a:pathLst>
+              <a:path extrusionOk="0" h="120000" w="120000">
+                <a:moveTo>
+                  <a:pt x="0" y="0"/>
+                </a:moveTo>
+                <a:lnTo>
+                  <a:pt x="120000" y="0"/>
+                </a:lnTo>
+                <a:lnTo>
+                  <a:pt x="120000" y="120000"/>
+                </a:lnTo>
+                <a:lnTo>
+                  <a:pt x="0" y="120000"/>
+                </a:lnTo>
+                <a:close/>
+              </a:path>
+            </a:pathLst>
+          </a:custGeom>
+        </p:spPr>
+      </p:sp>
+      <p:sp>
+        <p:nvSpPr>
+          <p:cNvPr id="153" name="Google Shape;153;g3803d3b2b91_0_27:notes"/>
+          <p:cNvSpPr txBox="1"/>
+          <p:nvPr>
+            <p:ph idx="1" type="body"/>
+          </p:nvPr>
+        </p:nvSpPr>
+        <p:spPr>
+          <a:xfrm>
+            <a:off x="685800" y="4343400"/>
+            <a:ext cx="5486400" cy="4114800"/>
+          </a:xfrm>
+          <a:prstGeom prst="rect">
+            <a:avLst/>
+          </a:prstGeom>
+        </p:spPr>
+        <p:txBody>
+          <a:bodyPr anchorCtr="0" anchor="t" bIns="91425" lIns="91425" spcFirstLastPara="1" rIns="91425" wrap="square" tIns="91425">
+            <a:noAutofit/>
+          </a:bodyPr>
+          <a:lstStyle/>
+          <a:p>
+            <a:pPr indent="0" lvl="0" marL="0" rtl="0" algn="l">
+              <a:spcBef>
+                <a:spcPts val="0"/>
+              </a:spcBef>
+              <a:spcAft>
+                <a:spcPts val="0"/>
+              </a:spcAft>
+              <a:buNone/>
+            </a:pPr>
+            <a:r>
+              <a:t/>
+            </a:r>
+            <a:endParaRPr/>
+          </a:p>
+        </p:txBody>
+      </p:sp>
+    </p:spTree>
+  </p:cSld>
+  <p:clrMapOvr>
+    <a:masterClrMapping/>
+  </p:clrMapOvr>
+</p:notes>
+</file>
+
+<file path=ppt/notesSlides/notesSlide16.xml><?xml version="1.0" encoding="utf-8"?>
+<p:notes xmlns:a="http://schemas.openxmlformats.org/drawingml/2006/main" xmlns:r="http://schemas.openxmlformats.org/officeDocument/2006/relationships" xmlns:mc="http://schemas.openxmlformats.org/markup-compatibility/2006" xmlns:mv="urn:schemas-microsoft-com:mac:vml" xmlns:p="http://schemas.openxmlformats.org/presentationml/2006/main" xmlns:c="http://schemas.openxmlformats.org/drawingml/2006/chart" xmlns:dgm="http://schemas.openxmlformats.org/drawingml/2006/diagram" xmlns:o="urn:schemas-microsoft-com:office:office" xmlns:v="urn:schemas-microsoft-com:vml" xmlns:pvml="urn:schemas-microsoft-com:office:powerpoint" xmlns:com="http://schemas.openxmlformats.org/drawingml/2006/compatibility" xmlns:p14="http://schemas.microsoft.com/office/powerpoint/2010/main" xmlns:p15="http://schemas.microsoft.com/office/powerpoint/2012/main" xmlns:ahyp="http://schemas.microsoft.com/office/drawing/2018/hyperlinkcolor" showMasterPhAnim="0" showMasterSp="0">
+  <p:cSld>
+    <p:spTree>
+      <p:nvGrpSpPr>
+        <p:cNvPr id="157" name="Shape 157"/>
+        <p:cNvGrpSpPr/>
+        <p:nvPr/>
+      </p:nvGrpSpPr>
+      <p:grpSpPr>
+        <a:xfrm>
+          <a:off x="0" y="0"/>
+          <a:ext cx="0" cy="0"/>
+          <a:chOff x="0" y="0"/>
+          <a:chExt cx="0" cy="0"/>
+        </a:xfrm>
+      </p:grpSpPr>
+      <p:sp>
+        <p:nvSpPr>
+          <p:cNvPr id="158" name="Google Shape;158;g3842cd3d2bb_0_12:notes"/>
+          <p:cNvSpPr/>
+          <p:nvPr>
+            <p:ph idx="2" type="sldImg"/>
+          </p:nvPr>
+        </p:nvSpPr>
+        <p:spPr>
+          <a:xfrm>
+            <a:off x="381300" y="685800"/>
+            <a:ext cx="6096000" cy="3429000"/>
+          </a:xfrm>
+          <a:custGeom>
+            <a:rect b="b" l="l" r="r" t="t"/>
+            <a:pathLst>
+              <a:path extrusionOk="0" h="120000" w="120000">
+                <a:moveTo>
+                  <a:pt x="0" y="0"/>
+                </a:moveTo>
+                <a:lnTo>
+                  <a:pt x="120000" y="0"/>
+                </a:lnTo>
+                <a:lnTo>
+                  <a:pt x="120000" y="120000"/>
+                </a:lnTo>
+                <a:lnTo>
+                  <a:pt x="0" y="120000"/>
+                </a:lnTo>
+                <a:close/>
+              </a:path>
+            </a:pathLst>
+          </a:custGeom>
+        </p:spPr>
+      </p:sp>
+      <p:sp>
+        <p:nvSpPr>
+          <p:cNvPr id="159" name="Google Shape;159;g3842cd3d2bb_0_12:notes"/>
+          <p:cNvSpPr txBox="1"/>
+          <p:nvPr>
+            <p:ph idx="1" type="body"/>
+          </p:nvPr>
+        </p:nvSpPr>
+        <p:spPr>
+          <a:xfrm>
+            <a:off x="685800" y="4343400"/>
+            <a:ext cx="5486400" cy="4114800"/>
+          </a:xfrm>
+          <a:prstGeom prst="rect">
+            <a:avLst/>
+          </a:prstGeom>
+        </p:spPr>
+        <p:txBody>
+          <a:bodyPr anchorCtr="0" anchor="t" bIns="91425" lIns="91425" spcFirstLastPara="1" rIns="91425" wrap="square" tIns="91425">
+            <a:noAutofit/>
+          </a:bodyPr>
+          <a:lstStyle/>
+          <a:p>
+            <a:pPr indent="0" lvl="0" marL="0" rtl="0" algn="l">
+              <a:spcBef>
+                <a:spcPts val="0"/>
+              </a:spcBef>
+              <a:spcAft>
+                <a:spcPts val="0"/>
+              </a:spcAft>
+              <a:buNone/>
+            </a:pPr>
+            <a:r>
+              <a:t/>
+            </a:r>
+            <a:endParaRPr/>
+          </a:p>
+        </p:txBody>
+      </p:sp>
+    </p:spTree>
+  </p:cSld>
+  <p:clrMapOvr>
+    <a:masterClrMapping/>
+  </p:clrMapOvr>
+</p:notes>
+</file>
+
+<file path=ppt/notesSlides/notesSlide17.xml><?xml version="1.0" encoding="utf-8"?>
+<p:notes xmlns:a="http://schemas.openxmlformats.org/drawingml/2006/main" xmlns:r="http://schemas.openxmlformats.org/officeDocument/2006/relationships" xmlns:mc="http://schemas.openxmlformats.org/markup-compatibility/2006" xmlns:mv="urn:schemas-microsoft-com:mac:vml" xmlns:p="http://schemas.openxmlformats.org/presentationml/2006/main" xmlns:c="http://schemas.openxmlformats.org/drawingml/2006/chart" xmlns:dgm="http://schemas.openxmlformats.org/drawingml/2006/diagram" xmlns:o="urn:schemas-microsoft-com:office:office" xmlns:v="urn:schemas-microsoft-com:vml" xmlns:pvml="urn:schemas-microsoft-com:office:powerpoint" xmlns:com="http://schemas.openxmlformats.org/drawingml/2006/compatibility" xmlns:p14="http://schemas.microsoft.com/office/powerpoint/2010/main" xmlns:p15="http://schemas.microsoft.com/office/powerpoint/2012/main" xmlns:ahyp="http://schemas.microsoft.com/office/drawing/2018/hyperlinkcolor" showMasterPhAnim="0" showMasterSp="0">
+  <p:cSld>
+    <p:spTree>
+      <p:nvGrpSpPr>
+        <p:cNvPr id="166" name="Shape 166"/>
+        <p:cNvGrpSpPr/>
+        <p:nvPr/>
+      </p:nvGrpSpPr>
+      <p:grpSpPr>
+        <a:xfrm>
+          <a:off x="0" y="0"/>
+          <a:ext cx="0" cy="0"/>
+          <a:chOff x="0" y="0"/>
+          <a:chExt cx="0" cy="0"/>
+        </a:xfrm>
+      </p:grpSpPr>
+      <p:sp>
+        <p:nvSpPr>
+          <p:cNvPr id="167" name="Google Shape;167;g37e297f581d_2_6:notes"/>
+          <p:cNvSpPr/>
+          <p:nvPr>
+            <p:ph idx="2" type="sldImg"/>
+          </p:nvPr>
+        </p:nvSpPr>
+        <p:spPr>
+          <a:xfrm>
+            <a:off x="381300" y="685800"/>
+            <a:ext cx="6096000" cy="3429000"/>
+          </a:xfrm>
+          <a:custGeom>
+            <a:rect b="b" l="l" r="r" t="t"/>
+            <a:pathLst>
+              <a:path extrusionOk="0" h="120000" w="120000">
+                <a:moveTo>
+                  <a:pt x="0" y="0"/>
+                </a:moveTo>
+                <a:lnTo>
+                  <a:pt x="120000" y="0"/>
+                </a:lnTo>
+                <a:lnTo>
+                  <a:pt x="120000" y="120000"/>
+                </a:lnTo>
+                <a:lnTo>
+                  <a:pt x="0" y="120000"/>
+                </a:lnTo>
+                <a:close/>
+              </a:path>
+            </a:pathLst>
+          </a:custGeom>
+        </p:spPr>
+      </p:sp>
+      <p:sp>
+        <p:nvSpPr>
+          <p:cNvPr id="168" name="Google Shape;168;g37e297f581d_2_6:notes"/>
+          <p:cNvSpPr txBox="1"/>
+          <p:nvPr>
+            <p:ph idx="1" type="body"/>
+          </p:nvPr>
+        </p:nvSpPr>
+        <p:spPr>
+          <a:xfrm>
+            <a:off x="685800" y="4343400"/>
+            <a:ext cx="5486400" cy="4114800"/>
+          </a:xfrm>
+          <a:prstGeom prst="rect">
+            <a:avLst/>
+          </a:prstGeom>
+        </p:spPr>
+        <p:txBody>
+          <a:bodyPr anchorCtr="0" anchor="t" bIns="91425" lIns="91425" spcFirstLastPara="1" rIns="91425" wrap="square" tIns="91425">
+            <a:noAutofit/>
+          </a:bodyPr>
+          <a:lstStyle/>
+          <a:p>
+            <a:pPr indent="0" lvl="0" marL="0" rtl="0" algn="l">
+              <a:spcBef>
+                <a:spcPts val="0"/>
+              </a:spcBef>
+              <a:spcAft>
+                <a:spcPts val="0"/>
+              </a:spcAft>
+              <a:buNone/>
+            </a:pPr>
+            <a:r>
+              <a:t/>
+            </a:r>
+            <a:endParaRPr/>
+          </a:p>
+        </p:txBody>
+      </p:sp>
+    </p:spTree>
+  </p:cSld>
+  <p:clrMapOvr>
+    <a:masterClrMapping/>
+  </p:clrMapOvr>
+</p:notes>
+</file>
+
+<file path=ppt/notesSlides/notesSlide18.xml><?xml version="1.0" encoding="utf-8"?>
+<p:notes xmlns:a="http://schemas.openxmlformats.org/drawingml/2006/main" xmlns:r="http://schemas.openxmlformats.org/officeDocument/2006/relationships" xmlns:mc="http://schemas.openxmlformats.org/markup-compatibility/2006" xmlns:mv="urn:schemas-microsoft-com:mac:vml" xmlns:p="http://schemas.openxmlformats.org/presentationml/2006/main" xmlns:c="http://schemas.openxmlformats.org/drawingml/2006/chart" xmlns:dgm="http://schemas.openxmlformats.org/drawingml/2006/diagram" xmlns:o="urn:schemas-microsoft-com:office:office" xmlns:v="urn:schemas-microsoft-com:vml" xmlns:pvml="urn:schemas-microsoft-com:office:powerpoint" xmlns:com="http://schemas.openxmlformats.org/drawingml/2006/compatibility" xmlns:p14="http://schemas.microsoft.com/office/powerpoint/2010/main" xmlns:p15="http://schemas.microsoft.com/office/powerpoint/2012/main" xmlns:ahyp="http://schemas.microsoft.com/office/drawing/2018/hyperlinkcolor" showMasterPhAnim="0" showMasterSp="0">
+  <p:cSld>
+    <p:spTree>
+      <p:nvGrpSpPr>
+        <p:cNvPr id="172" name="Shape 172"/>
+        <p:cNvGrpSpPr/>
+        <p:nvPr/>
+      </p:nvGrpSpPr>
+      <p:grpSpPr>
+        <a:xfrm>
+          <a:off x="0" y="0"/>
+          <a:ext cx="0" cy="0"/>
+          <a:chOff x="0" y="0"/>
+          <a:chExt cx="0" cy="0"/>
+        </a:xfrm>
+      </p:grpSpPr>
+      <p:sp>
+        <p:nvSpPr>
+          <p:cNvPr id="173" name="Google Shape;173;g37e297f581d_0_10:notes"/>
+          <p:cNvSpPr/>
+          <p:nvPr>
+            <p:ph idx="2" type="sldImg"/>
+          </p:nvPr>
+        </p:nvSpPr>
+        <p:spPr>
+          <a:xfrm>
+            <a:off x="381300" y="685800"/>
+            <a:ext cx="6096000" cy="3429000"/>
+          </a:xfrm>
+          <a:custGeom>
+            <a:rect b="b" l="l" r="r" t="t"/>
+            <a:pathLst>
+              <a:path extrusionOk="0" h="120000" w="120000">
+                <a:moveTo>
+                  <a:pt x="0" y="0"/>
+                </a:moveTo>
+                <a:lnTo>
+                  <a:pt x="120000" y="0"/>
+                </a:lnTo>
+                <a:lnTo>
+                  <a:pt x="120000" y="120000"/>
+                </a:lnTo>
+                <a:lnTo>
+                  <a:pt x="0" y="120000"/>
+                </a:lnTo>
+                <a:close/>
+              </a:path>
+            </a:pathLst>
+          </a:custGeom>
+        </p:spPr>
+      </p:sp>
+      <p:sp>
+        <p:nvSpPr>
+          <p:cNvPr id="174" name="Google Shape;174;g37e297f581d_0_10:notes"/>
+          <p:cNvSpPr txBox="1"/>
+          <p:nvPr>
+            <p:ph idx="1" type="body"/>
+          </p:nvPr>
+        </p:nvSpPr>
+        <p:spPr>
+          <a:xfrm>
+            <a:off x="685800" y="4343400"/>
+            <a:ext cx="5486400" cy="4114800"/>
+          </a:xfrm>
+          <a:prstGeom prst="rect">
+            <a:avLst/>
+          </a:prstGeom>
+        </p:spPr>
+        <p:txBody>
+          <a:bodyPr anchorCtr="0" anchor="t" bIns="91425" lIns="91425" spcFirstLastPara="1" rIns="91425" wrap="square" tIns="91425">
+            <a:noAutofit/>
+          </a:bodyPr>
+          <a:lstStyle/>
+          <a:p>
+            <a:pPr indent="0" lvl="0" marL="0" rtl="0" algn="l">
+              <a:spcBef>
+                <a:spcPts val="0"/>
+              </a:spcBef>
+              <a:spcAft>
+                <a:spcPts val="0"/>
+              </a:spcAft>
+              <a:buNone/>
+            </a:pPr>
+            <a:r>
+              <a:t/>
+            </a:r>
+            <a:endParaRPr/>
+          </a:p>
+        </p:txBody>
+      </p:sp>
+    </p:spTree>
+  </p:cSld>
+  <p:clrMapOvr>
+    <a:masterClrMapping/>
+  </p:clrMapOvr>
+</p:notes>
+</file>
+
+<file path=ppt/notesSlides/notesSlide19.xml><?xml version="1.0" encoding="utf-8"?>
+<p:notes xmlns:a="http://schemas.openxmlformats.org/drawingml/2006/main" xmlns:r="http://schemas.openxmlformats.org/officeDocument/2006/relationships" xmlns:mc="http://schemas.openxmlformats.org/markup-compatibility/2006" xmlns:mv="urn:schemas-microsoft-com:mac:vml" xmlns:p="http://schemas.openxmlformats.org/presentationml/2006/main" xmlns:c="http://schemas.openxmlformats.org/drawingml/2006/chart" xmlns:dgm="http://schemas.openxmlformats.org/drawingml/2006/diagram" xmlns:o="urn:schemas-microsoft-com:office:office" xmlns:v="urn:schemas-microsoft-com:vml" xmlns:pvml="urn:schemas-microsoft-com:office:powerpoint" xmlns:com="http://schemas.openxmlformats.org/drawingml/2006/compatibility" xmlns:p14="http://schemas.microsoft.com/office/powerpoint/2010/main" xmlns:p15="http://schemas.microsoft.com/office/powerpoint/2012/main" xmlns:ahyp="http://schemas.microsoft.com/office/drawing/2018/hyperlinkcolor" showMasterPhAnim="0" showMasterSp="0">
+  <p:cSld>
+    <p:spTree>
+      <p:nvGrpSpPr>
+        <p:cNvPr id="178" name="Shape 178"/>
+        <p:cNvGrpSpPr/>
+        <p:nvPr/>
+      </p:nvGrpSpPr>
+      <p:grpSpPr>
+        <a:xfrm>
+          <a:off x="0" y="0"/>
+          <a:ext cx="0" cy="0"/>
+          <a:chOff x="0" y="0"/>
+          <a:chExt cx="0" cy="0"/>
+        </a:xfrm>
+      </p:grpSpPr>
+      <p:sp>
+        <p:nvSpPr>
+          <p:cNvPr id="179" name="Google Shape;179;g37e297f581d_0_15:notes"/>
+          <p:cNvSpPr/>
+          <p:nvPr>
+            <p:ph idx="2" type="sldImg"/>
+          </p:nvPr>
+        </p:nvSpPr>
+        <p:spPr>
+          <a:xfrm>
+            <a:off x="381300" y="685800"/>
+            <a:ext cx="6096000" cy="3429000"/>
+          </a:xfrm>
+          <a:custGeom>
+            <a:rect b="b" l="l" r="r" t="t"/>
+            <a:pathLst>
+              <a:path extrusionOk="0" h="120000" w="120000">
+                <a:moveTo>
+                  <a:pt x="0" y="0"/>
+                </a:moveTo>
+                <a:lnTo>
+                  <a:pt x="120000" y="0"/>
+                </a:lnTo>
+                <a:lnTo>
+                  <a:pt x="120000" y="120000"/>
+                </a:lnTo>
+                <a:lnTo>
+                  <a:pt x="0" y="120000"/>
+                </a:lnTo>
+                <a:close/>
+              </a:path>
+            </a:pathLst>
+          </a:custGeom>
+        </p:spPr>
+      </p:sp>
+      <p:sp>
+        <p:nvSpPr>
+          <p:cNvPr id="180" name="Google Shape;180;g37e297f581d_0_15:notes"/>
           <p:cNvSpPr txBox="1"/>
           <p:nvPr>
             <p:ph idx="1" type="body"/>
@@ -1408,6 +1909,105 @@
 </p:notes>
 </file>
 
+<file path=ppt/notesSlides/notesSlide20.xml><?xml version="1.0" encoding="utf-8"?>
+<p:notes xmlns:a="http://schemas.openxmlformats.org/drawingml/2006/main" xmlns:r="http://schemas.openxmlformats.org/officeDocument/2006/relationships" xmlns:mc="http://schemas.openxmlformats.org/markup-compatibility/2006" xmlns:mv="urn:schemas-microsoft-com:mac:vml" xmlns:p="http://schemas.openxmlformats.org/presentationml/2006/main" xmlns:c="http://schemas.openxmlformats.org/drawingml/2006/chart" xmlns:dgm="http://schemas.openxmlformats.org/drawingml/2006/diagram" xmlns:o="urn:schemas-microsoft-com:office:office" xmlns:v="urn:schemas-microsoft-com:vml" xmlns:pvml="urn:schemas-microsoft-com:office:powerpoint" xmlns:com="http://schemas.openxmlformats.org/drawingml/2006/compatibility" xmlns:p14="http://schemas.microsoft.com/office/powerpoint/2010/main" xmlns:p15="http://schemas.microsoft.com/office/powerpoint/2012/main" xmlns:ahyp="http://schemas.microsoft.com/office/drawing/2018/hyperlinkcolor" showMasterPhAnim="0" showMasterSp="0">
+  <p:cSld>
+    <p:spTree>
+      <p:nvGrpSpPr>
+        <p:cNvPr id="184" name="Shape 184"/>
+        <p:cNvGrpSpPr/>
+        <p:nvPr/>
+      </p:nvGrpSpPr>
+      <p:grpSpPr>
+        <a:xfrm>
+          <a:off x="0" y="0"/>
+          <a:ext cx="0" cy="0"/>
+          <a:chOff x="0" y="0"/>
+          <a:chExt cx="0" cy="0"/>
+        </a:xfrm>
+      </p:grpSpPr>
+      <p:sp>
+        <p:nvSpPr>
+          <p:cNvPr id="185" name="Google Shape;185;g37e297f581d_2_14:notes"/>
+          <p:cNvSpPr/>
+          <p:nvPr>
+            <p:ph idx="2" type="sldImg"/>
+          </p:nvPr>
+        </p:nvSpPr>
+        <p:spPr>
+          <a:xfrm>
+            <a:off x="381300" y="685800"/>
+            <a:ext cx="6096000" cy="3429000"/>
+          </a:xfrm>
+          <a:custGeom>
+            <a:rect b="b" l="l" r="r" t="t"/>
+            <a:pathLst>
+              <a:path extrusionOk="0" h="120000" w="120000">
+                <a:moveTo>
+                  <a:pt x="0" y="0"/>
+                </a:moveTo>
+                <a:lnTo>
+                  <a:pt x="120000" y="0"/>
+                </a:lnTo>
+                <a:lnTo>
+                  <a:pt x="120000" y="120000"/>
+                </a:lnTo>
+                <a:lnTo>
+                  <a:pt x="0" y="120000"/>
+                </a:lnTo>
+                <a:close/>
+              </a:path>
+            </a:pathLst>
+          </a:custGeom>
+        </p:spPr>
+      </p:sp>
+      <p:sp>
+        <p:nvSpPr>
+          <p:cNvPr id="186" name="Google Shape;186;g37e297f581d_2_14:notes"/>
+          <p:cNvSpPr txBox="1"/>
+          <p:nvPr>
+            <p:ph idx="1" type="body"/>
+          </p:nvPr>
+        </p:nvSpPr>
+        <p:spPr>
+          <a:xfrm>
+            <a:off x="685800" y="4343400"/>
+            <a:ext cx="5486400" cy="4114800"/>
+          </a:xfrm>
+          <a:prstGeom prst="rect">
+            <a:avLst/>
+          </a:prstGeom>
+        </p:spPr>
+        <p:txBody>
+          <a:bodyPr anchorCtr="0" anchor="t" bIns="91425" lIns="91425" spcFirstLastPara="1" rIns="91425" wrap="square" tIns="91425">
+            <a:noAutofit/>
+          </a:bodyPr>
+          <a:lstStyle/>
+          <a:p>
+            <a:pPr indent="0" lvl="0" marL="0" rtl="0" algn="l">
+              <a:spcBef>
+                <a:spcPts val="0"/>
+              </a:spcBef>
+              <a:spcAft>
+                <a:spcPts val="0"/>
+              </a:spcAft>
+              <a:buNone/>
+            </a:pPr>
+            <a:r>
+              <a:t/>
+            </a:r>
+            <a:endParaRPr/>
+          </a:p>
+        </p:txBody>
+      </p:sp>
+    </p:spTree>
+  </p:cSld>
+  <p:clrMapOvr>
+    <a:masterClrMapping/>
+  </p:clrMapOvr>
+</p:notes>
+</file>
+
 <file path=ppt/notesSlides/notesSlide3.xml><?xml version="1.0" encoding="utf-8"?>
 <p:notes xmlns:a="http://schemas.openxmlformats.org/drawingml/2006/main" xmlns:r="http://schemas.openxmlformats.org/officeDocument/2006/relationships" xmlns:mc="http://schemas.openxmlformats.org/markup-compatibility/2006" xmlns:mv="urn:schemas-microsoft-com:mac:vml" xmlns:p="http://schemas.openxmlformats.org/presentationml/2006/main" xmlns:c="http://schemas.openxmlformats.org/drawingml/2006/chart" xmlns:dgm="http://schemas.openxmlformats.org/drawingml/2006/diagram" xmlns:o="urn:schemas-microsoft-com:office:office" xmlns:v="urn:schemas-microsoft-com:vml" xmlns:pvml="urn:schemas-microsoft-com:office:powerpoint" xmlns:com="http://schemas.openxmlformats.org/drawingml/2006/compatibility" xmlns:p14="http://schemas.microsoft.com/office/powerpoint/2010/main" xmlns:p15="http://schemas.microsoft.com/office/powerpoint/2012/main" xmlns:ahyp="http://schemas.microsoft.com/office/drawing/2018/hyperlinkcolor" showMasterPhAnim="0" showMasterSp="0">
   <p:cSld>
@@ -1724,7 +2324,7 @@
       </p:grpSpPr>
       <p:sp>
         <p:nvSpPr>
-          <p:cNvPr id="94" name="Google Shape;94;g37e297f581d_2_0:notes"/>
+          <p:cNvPr id="94" name="Google Shape;94;g3842cd3d2bb_0_6:notes"/>
           <p:cNvSpPr/>
           <p:nvPr>
             <p:ph idx="2" type="sldImg"/>
@@ -1759,7 +2359,7 @@
       </p:sp>
       <p:sp>
         <p:nvSpPr>
-          <p:cNvPr id="95" name="Google Shape;95;g37e297f581d_2_0:notes"/>
+          <p:cNvPr id="95" name="Google Shape;95;g3842cd3d2bb_0_6:notes"/>
           <p:cNvSpPr txBox="1"/>
           <p:nvPr>
             <p:ph idx="1" type="body"/>
@@ -1908,7 +2508,7 @@
   <p:cSld>
     <p:spTree>
       <p:nvGrpSpPr>
-        <p:cNvPr id="106" name="Shape 106"/>
+        <p:cNvPr id="105" name="Shape 105"/>
         <p:cNvGrpSpPr/>
         <p:nvPr/>
       </p:nvGrpSpPr>
@@ -1922,7 +2522,7 @@
       </p:grpSpPr>
       <p:sp>
         <p:nvSpPr>
-          <p:cNvPr id="107" name="Google Shape;107;g37eaed4b55a_0_7:notes"/>
+          <p:cNvPr id="106" name="Google Shape;106;g3803d3b2b91_0_0:notes"/>
           <p:cNvSpPr/>
           <p:nvPr>
             <p:ph idx="2" type="sldImg"/>
@@ -1957,7 +2557,7 @@
       </p:sp>
       <p:sp>
         <p:nvSpPr>
-          <p:cNvPr id="108" name="Google Shape;108;g37eaed4b55a_0_7:notes"/>
+          <p:cNvPr id="107" name="Google Shape;107;g3803d3b2b91_0_0:notes"/>
           <p:cNvSpPr txBox="1"/>
           <p:nvPr>
             <p:ph idx="1" type="body"/>
@@ -2007,7 +2607,7 @@
   <p:cSld>
     <p:spTree>
       <p:nvGrpSpPr>
-        <p:cNvPr id="113" name="Shape 113"/>
+        <p:cNvPr id="112" name="Shape 112"/>
         <p:cNvGrpSpPr/>
         <p:nvPr/>
       </p:nvGrpSpPr>
@@ -2021,7 +2621,7 @@
       </p:grpSpPr>
       <p:sp>
         <p:nvSpPr>
-          <p:cNvPr id="114" name="Google Shape;114;g37eaed4b55a_0_21:notes"/>
+          <p:cNvPr id="113" name="Google Shape;113;g37eaed4b55a_0_7:notes"/>
           <p:cNvSpPr/>
           <p:nvPr>
             <p:ph idx="2" type="sldImg"/>
@@ -2056,7 +2656,7 @@
       </p:sp>
       <p:sp>
         <p:nvSpPr>
-          <p:cNvPr id="115" name="Google Shape;115;g37eaed4b55a_0_21:notes"/>
+          <p:cNvPr id="114" name="Google Shape;114;g37eaed4b55a_0_7:notes"/>
           <p:cNvSpPr txBox="1"/>
           <p:nvPr>
             <p:ph idx="1" type="body"/>
@@ -7652,7 +8252,7 @@
   <p:cSld>
     <p:spTree>
       <p:nvGrpSpPr>
-        <p:cNvPr id="123" name="Shape 123"/>
+        <p:cNvPr id="122" name="Shape 122"/>
         <p:cNvGrpSpPr/>
         <p:nvPr/>
       </p:nvGrpSpPr>
@@ -7666,7 +8266,7 @@
       </p:grpSpPr>
       <p:sp>
         <p:nvSpPr>
-          <p:cNvPr id="124" name="Google Shape;124;p22"/>
+          <p:cNvPr id="123" name="Google Shape;123;p22"/>
           <p:cNvSpPr txBox="1"/>
           <p:nvPr>
             <p:ph type="title"/>
@@ -7702,15 +8302,248 @@
             </a:r>
             <a:r>
               <a:rPr lang="es" sz="2600"/>
-              <a:t>Implementación - AgregarDato()</a:t>
+              <a:t>Implementación - Buscar()</a:t>
             </a:r>
             <a:endParaRPr sz="2600"/>
           </a:p>
         </p:txBody>
       </p:sp>
-      <p:sp>
-        <p:nvSpPr>
-          <p:cNvPr id="125" name="Google Shape;125;p22"/>
+      <p:pic>
+        <p:nvPicPr>
+          <p:cNvPr id="124" name="Google Shape;124;p22" title="Buscar.png"/>
+          <p:cNvPicPr preferRelativeResize="0"/>
+          <p:nvPr/>
+        </p:nvPicPr>
+        <p:blipFill>
+          <a:blip r:embed="rId3">
+            <a:alphaModFix/>
+          </a:blip>
+          <a:stretch>
+            <a:fillRect/>
+          </a:stretch>
+        </p:blipFill>
+        <p:spPr>
+          <a:xfrm>
+            <a:off x="152400" y="1566800"/>
+            <a:ext cx="8839201" cy="2966943"/>
+          </a:xfrm>
+          <a:prstGeom prst="rect">
+            <a:avLst/>
+          </a:prstGeom>
+          <a:noFill/>
+          <a:ln>
+            <a:noFill/>
+          </a:ln>
+        </p:spPr>
+      </p:pic>
+    </p:spTree>
+  </p:cSld>
+  <p:clrMapOvr>
+    <a:masterClrMapping/>
+  </p:clrMapOvr>
+</p:sld>
+</file>
+
+<file path=ppt/slides/slide11.xml><?xml version="1.0" encoding="utf-8"?>
+<p:sld xmlns:a="http://schemas.openxmlformats.org/drawingml/2006/main" xmlns:r="http://schemas.openxmlformats.org/officeDocument/2006/relationships" xmlns:mc="http://schemas.openxmlformats.org/markup-compatibility/2006" xmlns:mv="urn:schemas-microsoft-com:mac:vml" xmlns:p="http://schemas.openxmlformats.org/presentationml/2006/main" xmlns:c="http://schemas.openxmlformats.org/drawingml/2006/chart" xmlns:dgm="http://schemas.openxmlformats.org/drawingml/2006/diagram" xmlns:o="urn:schemas-microsoft-com:office:office" xmlns:v="urn:schemas-microsoft-com:vml" xmlns:pvml="urn:schemas-microsoft-com:office:powerpoint" xmlns:com="http://schemas.openxmlformats.org/drawingml/2006/compatibility" xmlns:p14="http://schemas.microsoft.com/office/powerpoint/2010/main" xmlns:p15="http://schemas.microsoft.com/office/powerpoint/2012/main" xmlns:ahyp="http://schemas.microsoft.com/office/drawing/2018/hyperlinkcolor">
+  <p:cSld>
+    <p:spTree>
+      <p:nvGrpSpPr>
+        <p:cNvPr id="128" name="Shape 128"/>
+        <p:cNvGrpSpPr/>
+        <p:nvPr/>
+      </p:nvGrpSpPr>
+      <p:grpSpPr>
+        <a:xfrm>
+          <a:off x="0" y="0"/>
+          <a:ext cx="0" cy="0"/>
+          <a:chOff x="0" y="0"/>
+          <a:chExt cx="0" cy="0"/>
+        </a:xfrm>
+      </p:grpSpPr>
+      <p:sp>
+        <p:nvSpPr>
+          <p:cNvPr id="129" name="Google Shape;129;p23"/>
+          <p:cNvSpPr txBox="1"/>
+          <p:nvPr>
+            <p:ph type="title"/>
+          </p:nvPr>
+        </p:nvSpPr>
+        <p:spPr>
+          <a:xfrm>
+            <a:off x="311700" y="315925"/>
+            <a:ext cx="8520600" cy="831300"/>
+          </a:xfrm>
+          <a:prstGeom prst="rect">
+            <a:avLst/>
+          </a:prstGeom>
+        </p:spPr>
+        <p:txBody>
+          <a:bodyPr anchorCtr="0" anchor="b" bIns="91425" lIns="91425" spcFirstLastPara="1" rIns="91425" wrap="square" tIns="91425">
+            <a:normAutofit/>
+          </a:bodyPr>
+          <a:lstStyle/>
+          <a:p>
+            <a:pPr indent="0" lvl="0" marL="0" rtl="0" algn="l">
+              <a:spcBef>
+                <a:spcPts val="0"/>
+              </a:spcBef>
+              <a:spcAft>
+                <a:spcPts val="0"/>
+              </a:spcAft>
+              <a:buNone/>
+            </a:pPr>
+            <a:r>
+              <a:rPr lang="es"/>
+              <a:t>Desarrollo | </a:t>
+            </a:r>
+            <a:r>
+              <a:rPr lang="es" sz="2600"/>
+              <a:t>Implementación - Buscar()</a:t>
+            </a:r>
+            <a:endParaRPr sz="2600"/>
+          </a:p>
+        </p:txBody>
+      </p:sp>
+      <p:sp>
+        <p:nvSpPr>
+          <p:cNvPr id="130" name="Google Shape;130;p23"/>
+          <p:cNvSpPr txBox="1"/>
+          <p:nvPr>
+            <p:ph idx="1" type="body"/>
+          </p:nvPr>
+        </p:nvSpPr>
+        <p:spPr>
+          <a:xfrm>
+            <a:off x="311700" y="1225225"/>
+            <a:ext cx="8520600" cy="3354000"/>
+          </a:xfrm>
+          <a:prstGeom prst="rect">
+            <a:avLst/>
+          </a:prstGeom>
+        </p:spPr>
+        <p:txBody>
+          <a:bodyPr anchorCtr="0" anchor="t" bIns="91425" lIns="91425" spcFirstLastPara="1" rIns="91425" wrap="square" tIns="91425">
+            <a:normAutofit/>
+          </a:bodyPr>
+          <a:lstStyle/>
+          <a:p>
+            <a:pPr indent="0" lvl="0" marL="0" rtl="0" algn="l">
+              <a:spcBef>
+                <a:spcPts val="0"/>
+              </a:spcBef>
+              <a:spcAft>
+                <a:spcPts val="1200"/>
+              </a:spcAft>
+              <a:buNone/>
+            </a:pPr>
+            <a:r>
+              <a:rPr lang="es"/>
+              <a:t>Calculamos la distancia de cada nodo recursivamente. si el dato es menor al umbral se agrega a collected.</a:t>
+            </a:r>
+            <a:endParaRPr/>
+          </a:p>
+        </p:txBody>
+      </p:sp>
+      <p:pic>
+        <p:nvPicPr>
+          <p:cNvPr id="131" name="Google Shape;131;p23"/>
+          <p:cNvPicPr preferRelativeResize="0"/>
+          <p:nvPr/>
+        </p:nvPicPr>
+        <p:blipFill rotWithShape="1">
+          <a:blip r:embed="rId3">
+            <a:alphaModFix/>
+          </a:blip>
+          <a:srcRect b="62908" l="0" r="0" t="0"/>
+          <a:stretch/>
+        </p:blipFill>
+        <p:spPr>
+          <a:xfrm>
+            <a:off x="470300" y="2317750"/>
+            <a:ext cx="8203425" cy="1930399"/>
+          </a:xfrm>
+          <a:prstGeom prst="rect">
+            <a:avLst/>
+          </a:prstGeom>
+          <a:noFill/>
+          <a:ln>
+            <a:noFill/>
+          </a:ln>
+        </p:spPr>
+      </p:pic>
+    </p:spTree>
+  </p:cSld>
+  <p:clrMapOvr>
+    <a:masterClrMapping/>
+  </p:clrMapOvr>
+</p:sld>
+</file>
+
+<file path=ppt/slides/slide12.xml><?xml version="1.0" encoding="utf-8"?>
+<p:sld xmlns:a="http://schemas.openxmlformats.org/drawingml/2006/main" xmlns:r="http://schemas.openxmlformats.org/officeDocument/2006/relationships" xmlns:mc="http://schemas.openxmlformats.org/markup-compatibility/2006" xmlns:mv="urn:schemas-microsoft-com:mac:vml" xmlns:p="http://schemas.openxmlformats.org/presentationml/2006/main" xmlns:c="http://schemas.openxmlformats.org/drawingml/2006/chart" xmlns:dgm="http://schemas.openxmlformats.org/drawingml/2006/diagram" xmlns:o="urn:schemas-microsoft-com:office:office" xmlns:v="urn:schemas-microsoft-com:vml" xmlns:pvml="urn:schemas-microsoft-com:office:powerpoint" xmlns:com="http://schemas.openxmlformats.org/drawingml/2006/compatibility" xmlns:p14="http://schemas.microsoft.com/office/powerpoint/2010/main" xmlns:p15="http://schemas.microsoft.com/office/powerpoint/2012/main" xmlns:ahyp="http://schemas.microsoft.com/office/drawing/2018/hyperlinkcolor">
+  <p:cSld>
+    <p:spTree>
+      <p:nvGrpSpPr>
+        <p:cNvPr id="135" name="Shape 135"/>
+        <p:cNvGrpSpPr/>
+        <p:nvPr/>
+      </p:nvGrpSpPr>
+      <p:grpSpPr>
+        <a:xfrm>
+          <a:off x="0" y="0"/>
+          <a:ext cx="0" cy="0"/>
+          <a:chOff x="0" y="0"/>
+          <a:chExt cx="0" cy="0"/>
+        </a:xfrm>
+      </p:grpSpPr>
+      <p:sp>
+        <p:nvSpPr>
+          <p:cNvPr id="136" name="Google Shape;136;p24"/>
+          <p:cNvSpPr txBox="1"/>
+          <p:nvPr>
+            <p:ph type="title"/>
+          </p:nvPr>
+        </p:nvSpPr>
+        <p:spPr>
+          <a:xfrm>
+            <a:off x="311700" y="315925"/>
+            <a:ext cx="8520600" cy="831300"/>
+          </a:xfrm>
+          <a:prstGeom prst="rect">
+            <a:avLst/>
+          </a:prstGeom>
+        </p:spPr>
+        <p:txBody>
+          <a:bodyPr anchorCtr="0" anchor="b" bIns="91425" lIns="91425" spcFirstLastPara="1" rIns="91425" wrap="square" tIns="91425">
+            <a:normAutofit/>
+          </a:bodyPr>
+          <a:lstStyle/>
+          <a:p>
+            <a:pPr indent="0" lvl="0" marL="0" rtl="0" algn="l">
+              <a:spcBef>
+                <a:spcPts val="0"/>
+              </a:spcBef>
+              <a:spcAft>
+                <a:spcPts val="0"/>
+              </a:spcAft>
+              <a:buNone/>
+            </a:pPr>
+            <a:r>
+              <a:rPr lang="es"/>
+              <a:t>Desarrollo | </a:t>
+            </a:r>
+            <a:r>
+              <a:rPr lang="es" sz="2600"/>
+              <a:t>Implementación - Buscar()</a:t>
+            </a:r>
+            <a:endParaRPr sz="2600"/>
+          </a:p>
+        </p:txBody>
+      </p:sp>
+      <p:sp>
+        <p:nvSpPr>
+          <p:cNvPr id="137" name="Google Shape;137;p24"/>
           <p:cNvSpPr txBox="1"/>
           <p:nvPr>
             <p:ph idx="1" type="body"/>
@@ -7758,7 +8591,7 @@
       </p:sp>
       <p:pic>
         <p:nvPicPr>
-          <p:cNvPr id="126" name="Google Shape;126;p22"/>
+          <p:cNvPr id="138" name="Google Shape;138;p24"/>
           <p:cNvPicPr preferRelativeResize="0"/>
           <p:nvPr/>
         </p:nvPicPr>
@@ -7783,225 +8616,6 @@
           </a:ln>
         </p:spPr>
       </p:pic>
-    </p:spTree>
-  </p:cSld>
-  <p:clrMapOvr>
-    <a:masterClrMapping/>
-  </p:clrMapOvr>
-</p:sld>
-</file>
-
-<file path=ppt/slides/slide11.xml><?xml version="1.0" encoding="utf-8"?>
-<p:sld xmlns:a="http://schemas.openxmlformats.org/drawingml/2006/main" xmlns:r="http://schemas.openxmlformats.org/officeDocument/2006/relationships" xmlns:mc="http://schemas.openxmlformats.org/markup-compatibility/2006" xmlns:mv="urn:schemas-microsoft-com:mac:vml" xmlns:p="http://schemas.openxmlformats.org/presentationml/2006/main" xmlns:c="http://schemas.openxmlformats.org/drawingml/2006/chart" xmlns:dgm="http://schemas.openxmlformats.org/drawingml/2006/diagram" xmlns:o="urn:schemas-microsoft-com:office:office" xmlns:v="urn:schemas-microsoft-com:vml" xmlns:pvml="urn:schemas-microsoft-com:office:powerpoint" xmlns:com="http://schemas.openxmlformats.org/drawingml/2006/compatibility" xmlns:p14="http://schemas.microsoft.com/office/powerpoint/2010/main" xmlns:p15="http://schemas.microsoft.com/office/powerpoint/2012/main" xmlns:ahyp="http://schemas.microsoft.com/office/drawing/2018/hyperlinkcolor">
-  <p:cSld>
-    <p:spTree>
-      <p:nvGrpSpPr>
-        <p:cNvPr id="130" name="Shape 130"/>
-        <p:cNvGrpSpPr/>
-        <p:nvPr/>
-      </p:nvGrpSpPr>
-      <p:grpSpPr>
-        <a:xfrm>
-          <a:off x="0" y="0"/>
-          <a:ext cx="0" cy="0"/>
-          <a:chOff x="0" y="0"/>
-          <a:chExt cx="0" cy="0"/>
-        </a:xfrm>
-      </p:grpSpPr>
-      <p:sp>
-        <p:nvSpPr>
-          <p:cNvPr id="131" name="Google Shape;131;p23"/>
-          <p:cNvSpPr txBox="1"/>
-          <p:nvPr>
-            <p:ph type="title"/>
-          </p:nvPr>
-        </p:nvSpPr>
-        <p:spPr>
-          <a:xfrm>
-            <a:off x="311700" y="315925"/>
-            <a:ext cx="8520600" cy="831300"/>
-          </a:xfrm>
-          <a:prstGeom prst="rect">
-            <a:avLst/>
-          </a:prstGeom>
-        </p:spPr>
-        <p:txBody>
-          <a:bodyPr anchorCtr="0" anchor="b" bIns="91425" lIns="91425" spcFirstLastPara="1" rIns="91425" wrap="square" tIns="91425">
-            <a:normAutofit/>
-          </a:bodyPr>
-          <a:lstStyle/>
-          <a:p>
-            <a:pPr indent="0" lvl="0" marL="0" rtl="0" algn="l">
-              <a:spcBef>
-                <a:spcPts val="0"/>
-              </a:spcBef>
-              <a:spcAft>
-                <a:spcPts val="0"/>
-              </a:spcAft>
-              <a:buNone/>
-            </a:pPr>
-            <a:r>
-              <a:rPr lang="es"/>
-              <a:t>Desarrollo | </a:t>
-            </a:r>
-            <a:r>
-              <a:rPr lang="es" sz="2600"/>
-              <a:t>Futuro</a:t>
-            </a:r>
-            <a:endParaRPr/>
-          </a:p>
-        </p:txBody>
-      </p:sp>
-      <p:sp>
-        <p:nvSpPr>
-          <p:cNvPr id="132" name="Google Shape;132;p23"/>
-          <p:cNvSpPr txBox="1"/>
-          <p:nvPr>
-            <p:ph idx="1" type="body"/>
-          </p:nvPr>
-        </p:nvSpPr>
-        <p:spPr>
-          <a:xfrm>
-            <a:off x="311700" y="1225225"/>
-            <a:ext cx="8520600" cy="3354000"/>
-          </a:xfrm>
-          <a:prstGeom prst="rect">
-            <a:avLst/>
-          </a:prstGeom>
-        </p:spPr>
-        <p:txBody>
-          <a:bodyPr anchorCtr="0" anchor="t" bIns="91425" lIns="91425" spcFirstLastPara="1" rIns="91425" wrap="square" tIns="91425">
-            <a:normAutofit/>
-          </a:bodyPr>
-          <a:lstStyle/>
-          <a:p>
-            <a:pPr indent="0" lvl="0" marL="0" rtl="0" algn="l">
-              <a:spcBef>
-                <a:spcPts val="0"/>
-              </a:spcBef>
-              <a:spcAft>
-                <a:spcPts val="1200"/>
-              </a:spcAft>
-              <a:buClr>
-                <a:schemeClr val="dk1"/>
-              </a:buClr>
-              <a:buSzPts val="1100"/>
-              <a:buFont typeface="Arial"/>
-              <a:buNone/>
-            </a:pPr>
-            <a:r>
-              <a:rPr i="1" lang="es"/>
-              <a:t>Esto va cuando se termine por completo</a:t>
-            </a:r>
-            <a:endParaRPr/>
-          </a:p>
-        </p:txBody>
-      </p:sp>
-    </p:spTree>
-  </p:cSld>
-  <p:clrMapOvr>
-    <a:masterClrMapping/>
-  </p:clrMapOvr>
-</p:sld>
-</file>
-
-<file path=ppt/slides/slide12.xml><?xml version="1.0" encoding="utf-8"?>
-<p:sld xmlns:a="http://schemas.openxmlformats.org/drawingml/2006/main" xmlns:r="http://schemas.openxmlformats.org/officeDocument/2006/relationships" xmlns:mc="http://schemas.openxmlformats.org/markup-compatibility/2006" xmlns:mv="urn:schemas-microsoft-com:mac:vml" xmlns:p="http://schemas.openxmlformats.org/presentationml/2006/main" xmlns:c="http://schemas.openxmlformats.org/drawingml/2006/chart" xmlns:dgm="http://schemas.openxmlformats.org/drawingml/2006/diagram" xmlns:o="urn:schemas-microsoft-com:office:office" xmlns:v="urn:schemas-microsoft-com:vml" xmlns:pvml="urn:schemas-microsoft-com:office:powerpoint" xmlns:com="http://schemas.openxmlformats.org/drawingml/2006/compatibility" xmlns:p14="http://schemas.microsoft.com/office/powerpoint/2010/main" xmlns:p15="http://schemas.microsoft.com/office/powerpoint/2012/main" xmlns:ahyp="http://schemas.microsoft.com/office/drawing/2018/hyperlinkcolor">
-  <p:cSld>
-    <p:spTree>
-      <p:nvGrpSpPr>
-        <p:cNvPr id="136" name="Shape 136"/>
-        <p:cNvGrpSpPr/>
-        <p:nvPr/>
-      </p:nvGrpSpPr>
-      <p:grpSpPr>
-        <a:xfrm>
-          <a:off x="0" y="0"/>
-          <a:ext cx="0" cy="0"/>
-          <a:chOff x="0" y="0"/>
-          <a:chExt cx="0" cy="0"/>
-        </a:xfrm>
-      </p:grpSpPr>
-      <p:sp>
-        <p:nvSpPr>
-          <p:cNvPr id="137" name="Google Shape;137;p24"/>
-          <p:cNvSpPr txBox="1"/>
-          <p:nvPr>
-            <p:ph type="title"/>
-          </p:nvPr>
-        </p:nvSpPr>
-        <p:spPr>
-          <a:xfrm>
-            <a:off x="311700" y="315925"/>
-            <a:ext cx="8520600" cy="831300"/>
-          </a:xfrm>
-          <a:prstGeom prst="rect">
-            <a:avLst/>
-          </a:prstGeom>
-        </p:spPr>
-        <p:txBody>
-          <a:bodyPr anchorCtr="0" anchor="b" bIns="91425" lIns="91425" spcFirstLastPara="1" rIns="91425" wrap="square" tIns="91425">
-            <a:normAutofit/>
-          </a:bodyPr>
-          <a:lstStyle/>
-          <a:p>
-            <a:pPr indent="0" lvl="0" marL="0" rtl="0" algn="l">
-              <a:spcBef>
-                <a:spcPts val="0"/>
-              </a:spcBef>
-              <a:spcAft>
-                <a:spcPts val="0"/>
-              </a:spcAft>
-              <a:buNone/>
-            </a:pPr>
-            <a:r>
-              <a:rPr lang="es"/>
-              <a:t>Demostración</a:t>
-            </a:r>
-            <a:endParaRPr/>
-          </a:p>
-        </p:txBody>
-      </p:sp>
-      <p:sp>
-        <p:nvSpPr>
-          <p:cNvPr id="138" name="Google Shape;138;p24"/>
-          <p:cNvSpPr txBox="1"/>
-          <p:nvPr>
-            <p:ph idx="1" type="body"/>
-          </p:nvPr>
-        </p:nvSpPr>
-        <p:spPr>
-          <a:xfrm>
-            <a:off x="311700" y="1225225"/>
-            <a:ext cx="8520600" cy="3354000"/>
-          </a:xfrm>
-          <a:prstGeom prst="rect">
-            <a:avLst/>
-          </a:prstGeom>
-        </p:spPr>
-        <p:txBody>
-          <a:bodyPr anchorCtr="0" anchor="t" bIns="91425" lIns="91425" spcFirstLastPara="1" rIns="91425" wrap="square" tIns="91425">
-            <a:normAutofit/>
-          </a:bodyPr>
-          <a:lstStyle/>
-          <a:p>
-            <a:pPr indent="0" lvl="0" marL="0" rtl="0" algn="l">
-              <a:spcBef>
-                <a:spcPts val="0"/>
-              </a:spcBef>
-              <a:spcAft>
-                <a:spcPts val="1200"/>
-              </a:spcAft>
-              <a:buNone/>
-            </a:pPr>
-            <a:r>
-              <a:rPr i="1" lang="es"/>
-              <a:t>Esto va cuando se termine por completo</a:t>
-            </a:r>
-            <a:endParaRPr i="1"/>
-          </a:p>
-        </p:txBody>
-      </p:sp>
     </p:spTree>
   </p:cSld>
   <p:clrMapOvr>
@@ -8061,141 +8675,44 @@
             </a:pPr>
             <a:r>
               <a:rPr lang="es"/>
-              <a:t>Reflexiones</a:t>
+              <a:t>Desarrollo | </a:t>
             </a:r>
-            <a:endParaRPr/>
+            <a:r>
+              <a:rPr lang="es" sz="2600"/>
+              <a:t>Implementación - Consulta 1</a:t>
+            </a:r>
+            <a:endParaRPr sz="2600"/>
           </a:p>
         </p:txBody>
       </p:sp>
-      <p:sp>
-        <p:nvSpPr>
-          <p:cNvPr id="144" name="Google Shape;144;p25"/>
-          <p:cNvSpPr txBox="1"/>
-          <p:nvPr>
-            <p:ph idx="1" type="body"/>
-          </p:nvPr>
-        </p:nvSpPr>
-        <p:spPr>
-          <a:xfrm>
-            <a:off x="311700" y="1225225"/>
-            <a:ext cx="8520600" cy="3354000"/>
+      <p:pic>
+        <p:nvPicPr>
+          <p:cNvPr id="144" name="Google Shape;144;p25" title="Consulta1.png"/>
+          <p:cNvPicPr preferRelativeResize="0"/>
+          <p:nvPr/>
+        </p:nvPicPr>
+        <p:blipFill>
+          <a:blip r:embed="rId3">
+            <a:alphaModFix/>
+          </a:blip>
+          <a:stretch>
+            <a:fillRect/>
+          </a:stretch>
+        </p:blipFill>
+        <p:spPr>
+          <a:xfrm>
+            <a:off x="107725" y="1512625"/>
+            <a:ext cx="8928550" cy="3063075"/>
           </a:xfrm>
           <a:prstGeom prst="rect">
             <a:avLst/>
           </a:prstGeom>
-        </p:spPr>
-        <p:txBody>
-          <a:bodyPr anchorCtr="0" anchor="t" bIns="91425" lIns="91425" spcFirstLastPara="1" rIns="91425" wrap="square" tIns="91425">
-            <a:normAutofit/>
-          </a:bodyPr>
-          <a:lstStyle/>
-          <a:p>
-            <a:pPr indent="0" lvl="0" marL="0" rtl="0" algn="l">
-              <a:spcBef>
-                <a:spcPts val="0"/>
-              </a:spcBef>
-              <a:spcAft>
-                <a:spcPts val="0"/>
-              </a:spcAft>
-              <a:buNone/>
-            </a:pPr>
-            <a:r>
-              <a:rPr lang="es"/>
-              <a:t>Durante la realización del trabajo aprendí:</a:t>
-            </a:r>
-            <a:endParaRPr/>
-          </a:p>
-          <a:p>
-            <a:pPr indent="-342900" lvl="0" marL="457200" rtl="0" algn="l">
-              <a:spcBef>
-                <a:spcPts val="1200"/>
-              </a:spcBef>
-              <a:spcAft>
-                <a:spcPts val="0"/>
-              </a:spcAft>
-              <a:buSzPts val="1800"/>
-              <a:buChar char="-"/>
-            </a:pPr>
-            <a:r>
-              <a:rPr lang="es"/>
-              <a:t>Árboles BK (</a:t>
-            </a:r>
-            <a:r>
-              <a:rPr lang="es"/>
-              <a:t>Burkhard-Keller tree)</a:t>
-            </a:r>
-            <a:endParaRPr/>
-          </a:p>
-          <a:p>
-            <a:pPr indent="-342900" lvl="0" marL="457200" rtl="0" algn="l">
-              <a:spcBef>
-                <a:spcPts val="0"/>
-              </a:spcBef>
-              <a:spcAft>
-                <a:spcPts val="0"/>
-              </a:spcAft>
-              <a:buSzPts val="1800"/>
-              <a:buChar char="-"/>
-            </a:pPr>
-            <a:r>
-              <a:rPr lang="es"/>
-              <a:t>Árboles generales en C#</a:t>
-            </a:r>
-            <a:endParaRPr/>
-          </a:p>
-          <a:p>
-            <a:pPr indent="-342900" lvl="0" marL="457200" rtl="0" algn="l">
-              <a:spcBef>
-                <a:spcPts val="0"/>
-              </a:spcBef>
-              <a:spcAft>
-                <a:spcPts val="0"/>
-              </a:spcAft>
-              <a:buSzPts val="1800"/>
-              <a:buChar char="-"/>
-            </a:pPr>
-            <a:r>
-              <a:rPr lang="es"/>
-              <a:t>Recorrido de árboles</a:t>
-            </a:r>
-            <a:endParaRPr/>
-          </a:p>
-          <a:p>
-            <a:pPr indent="-342900" lvl="0" marL="457200" rtl="0" algn="l">
-              <a:spcBef>
-                <a:spcPts val="0"/>
-              </a:spcBef>
-              <a:spcAft>
-                <a:spcPts val="0"/>
-              </a:spcAft>
-              <a:buSzPts val="1800"/>
-              <a:buChar char="-"/>
-            </a:pPr>
-            <a:r>
-              <a:rPr lang="es"/>
-              <a:t>Recursión</a:t>
-            </a:r>
-            <a:endParaRPr/>
-          </a:p>
-          <a:p>
-            <a:pPr indent="-342900" lvl="0" marL="457200" rtl="0" algn="l">
-              <a:spcBef>
-                <a:spcPts val="0"/>
-              </a:spcBef>
-              <a:spcAft>
-                <a:spcPts val="0"/>
-              </a:spcAft>
-              <a:buSzPts val="1800"/>
-              <a:buChar char="-"/>
-            </a:pPr>
-            <a:r>
-              <a:rPr lang="es"/>
-              <a:t>Tipos de datos genéricos</a:t>
-            </a:r>
-            <a:endParaRPr/>
-          </a:p>
-        </p:txBody>
-      </p:sp>
+          <a:noFill/>
+          <a:ln>
+            <a:noFill/>
+          </a:ln>
+        </p:spPr>
+      </p:pic>
     </p:spTree>
   </p:cSld>
   <p:clrMapOvr>
@@ -8226,13 +8743,13 @@
           <p:cNvPr id="149" name="Google Shape;149;p26"/>
           <p:cNvSpPr txBox="1"/>
           <p:nvPr>
-            <p:ph type="ctrTitle"/>
+            <p:ph type="title"/>
           </p:nvPr>
         </p:nvSpPr>
         <p:spPr>
           <a:xfrm>
-            <a:off x="3044700" y="1736355"/>
-            <a:ext cx="3054600" cy="1537200"/>
+            <a:off x="311700" y="315925"/>
+            <a:ext cx="8520600" cy="831300"/>
           </a:xfrm>
           <a:prstGeom prst="rect">
             <a:avLst/>
@@ -8244,7 +8761,7 @@
           </a:bodyPr>
           <a:lstStyle/>
           <a:p>
-            <a:pPr indent="0" lvl="0" marL="0" rtl="0" algn="ctr">
+            <a:pPr indent="0" lvl="0" marL="0" rtl="0" algn="l">
               <a:spcBef>
                 <a:spcPts val="0"/>
               </a:spcBef>
@@ -8255,7 +8772,780 @@
             </a:pPr>
             <a:r>
               <a:rPr lang="es"/>
-              <a:t>¡Muchas gracias por su atención!</a:t>
+              <a:t>Desarrollo | </a:t>
+            </a:r>
+            <a:r>
+              <a:rPr lang="es" sz="2600"/>
+              <a:t>Implementación - Consulta 2</a:t>
+            </a:r>
+            <a:endParaRPr sz="2600"/>
+          </a:p>
+        </p:txBody>
+      </p:sp>
+      <p:sp>
+        <p:nvSpPr>
+          <p:cNvPr id="150" name="Google Shape;150;p26"/>
+          <p:cNvSpPr txBox="1"/>
+          <p:nvPr>
+            <p:ph idx="1" type="body"/>
+          </p:nvPr>
+        </p:nvSpPr>
+        <p:spPr>
+          <a:xfrm>
+            <a:off x="311700" y="1225225"/>
+            <a:ext cx="8520600" cy="3354000"/>
+          </a:xfrm>
+          <a:prstGeom prst="rect">
+            <a:avLst/>
+          </a:prstGeom>
+        </p:spPr>
+        <p:txBody>
+          <a:bodyPr anchorCtr="0" anchor="t" bIns="91425" lIns="91425" spcFirstLastPara="1" rIns="91425" wrap="square" tIns="91425">
+            <a:normAutofit/>
+          </a:bodyPr>
+          <a:lstStyle/>
+          <a:p>
+            <a:pPr indent="0" lvl="0" marL="0" rtl="0" algn="l">
+              <a:spcBef>
+                <a:spcPts val="0"/>
+              </a:spcBef>
+              <a:spcAft>
+                <a:spcPts val="1200"/>
+              </a:spcAft>
+              <a:buNone/>
+            </a:pPr>
+            <a:r>
+              <a:t/>
+            </a:r>
+            <a:endParaRPr/>
+          </a:p>
+        </p:txBody>
+      </p:sp>
+    </p:spTree>
+  </p:cSld>
+  <p:clrMapOvr>
+    <a:masterClrMapping/>
+  </p:clrMapOvr>
+</p:sld>
+</file>
+
+<file path=ppt/slides/slide15.xml><?xml version="1.0" encoding="utf-8"?>
+<p:sld xmlns:a="http://schemas.openxmlformats.org/drawingml/2006/main" xmlns:r="http://schemas.openxmlformats.org/officeDocument/2006/relationships" xmlns:mc="http://schemas.openxmlformats.org/markup-compatibility/2006" xmlns:mv="urn:schemas-microsoft-com:mac:vml" xmlns:p="http://schemas.openxmlformats.org/presentationml/2006/main" xmlns:c="http://schemas.openxmlformats.org/drawingml/2006/chart" xmlns:dgm="http://schemas.openxmlformats.org/drawingml/2006/diagram" xmlns:o="urn:schemas-microsoft-com:office:office" xmlns:v="urn:schemas-microsoft-com:vml" xmlns:pvml="urn:schemas-microsoft-com:office:powerpoint" xmlns:com="http://schemas.openxmlformats.org/drawingml/2006/compatibility" xmlns:p14="http://schemas.microsoft.com/office/powerpoint/2010/main" xmlns:p15="http://schemas.microsoft.com/office/powerpoint/2012/main" xmlns:ahyp="http://schemas.microsoft.com/office/drawing/2018/hyperlinkcolor">
+  <p:cSld>
+    <p:spTree>
+      <p:nvGrpSpPr>
+        <p:cNvPr id="154" name="Shape 154"/>
+        <p:cNvGrpSpPr/>
+        <p:nvPr/>
+      </p:nvGrpSpPr>
+      <p:grpSpPr>
+        <a:xfrm>
+          <a:off x="0" y="0"/>
+          <a:ext cx="0" cy="0"/>
+          <a:chOff x="0" y="0"/>
+          <a:chExt cx="0" cy="0"/>
+        </a:xfrm>
+      </p:grpSpPr>
+      <p:sp>
+        <p:nvSpPr>
+          <p:cNvPr id="155" name="Google Shape;155;p27"/>
+          <p:cNvSpPr txBox="1"/>
+          <p:nvPr>
+            <p:ph type="title"/>
+          </p:nvPr>
+        </p:nvSpPr>
+        <p:spPr>
+          <a:xfrm>
+            <a:off x="311700" y="315925"/>
+            <a:ext cx="8520600" cy="831300"/>
+          </a:xfrm>
+          <a:prstGeom prst="rect">
+            <a:avLst/>
+          </a:prstGeom>
+        </p:spPr>
+        <p:txBody>
+          <a:bodyPr anchorCtr="0" anchor="b" bIns="91425" lIns="91425" spcFirstLastPara="1" rIns="91425" wrap="square" tIns="91425">
+            <a:normAutofit/>
+          </a:bodyPr>
+          <a:lstStyle/>
+          <a:p>
+            <a:pPr indent="0" lvl="0" marL="0" rtl="0" algn="l">
+              <a:spcBef>
+                <a:spcPts val="0"/>
+              </a:spcBef>
+              <a:spcAft>
+                <a:spcPts val="0"/>
+              </a:spcAft>
+              <a:buNone/>
+            </a:pPr>
+            <a:r>
+              <a:rPr lang="es"/>
+              <a:t>Desarrollo | </a:t>
+            </a:r>
+            <a:r>
+              <a:rPr lang="es" sz="2600"/>
+              <a:t>Implementación - Consulta 3</a:t>
+            </a:r>
+            <a:endParaRPr sz="2600"/>
+          </a:p>
+        </p:txBody>
+      </p:sp>
+      <p:sp>
+        <p:nvSpPr>
+          <p:cNvPr id="156" name="Google Shape;156;p27"/>
+          <p:cNvSpPr txBox="1"/>
+          <p:nvPr>
+            <p:ph idx="1" type="body"/>
+          </p:nvPr>
+        </p:nvSpPr>
+        <p:spPr>
+          <a:xfrm>
+            <a:off x="311700" y="1225225"/>
+            <a:ext cx="8520600" cy="3354000"/>
+          </a:xfrm>
+          <a:prstGeom prst="rect">
+            <a:avLst/>
+          </a:prstGeom>
+        </p:spPr>
+        <p:txBody>
+          <a:bodyPr anchorCtr="0" anchor="t" bIns="91425" lIns="91425" spcFirstLastPara="1" rIns="91425" wrap="square" tIns="91425">
+            <a:normAutofit/>
+          </a:bodyPr>
+          <a:lstStyle/>
+          <a:p>
+            <a:pPr indent="0" lvl="0" marL="0" rtl="0" algn="l">
+              <a:spcBef>
+                <a:spcPts val="0"/>
+              </a:spcBef>
+              <a:spcAft>
+                <a:spcPts val="1200"/>
+              </a:spcAft>
+              <a:buNone/>
+            </a:pPr>
+            <a:r>
+              <a:t/>
+            </a:r>
+            <a:endParaRPr/>
+          </a:p>
+        </p:txBody>
+      </p:sp>
+    </p:spTree>
+  </p:cSld>
+  <p:clrMapOvr>
+    <a:masterClrMapping/>
+  </p:clrMapOvr>
+</p:sld>
+</file>
+
+<file path=ppt/slides/slide16.xml><?xml version="1.0" encoding="utf-8"?>
+<p:sld xmlns:a="http://schemas.openxmlformats.org/drawingml/2006/main" xmlns:r="http://schemas.openxmlformats.org/officeDocument/2006/relationships" xmlns:mc="http://schemas.openxmlformats.org/markup-compatibility/2006" xmlns:mv="urn:schemas-microsoft-com:mac:vml" xmlns:p="http://schemas.openxmlformats.org/presentationml/2006/main" xmlns:c="http://schemas.openxmlformats.org/drawingml/2006/chart" xmlns:dgm="http://schemas.openxmlformats.org/drawingml/2006/diagram" xmlns:o="urn:schemas-microsoft-com:office:office" xmlns:v="urn:schemas-microsoft-com:vml" xmlns:pvml="urn:schemas-microsoft-com:office:powerpoint" xmlns:com="http://schemas.openxmlformats.org/drawingml/2006/compatibility" xmlns:p14="http://schemas.microsoft.com/office/powerpoint/2010/main" xmlns:p15="http://schemas.microsoft.com/office/powerpoint/2012/main" xmlns:ahyp="http://schemas.microsoft.com/office/drawing/2018/hyperlinkcolor">
+  <p:cSld>
+    <p:spTree>
+      <p:nvGrpSpPr>
+        <p:cNvPr id="160" name="Shape 160"/>
+        <p:cNvGrpSpPr/>
+        <p:nvPr/>
+      </p:nvGrpSpPr>
+      <p:grpSpPr>
+        <a:xfrm>
+          <a:off x="0" y="0"/>
+          <a:ext cx="0" cy="0"/>
+          <a:chOff x="0" y="0"/>
+          <a:chExt cx="0" cy="0"/>
+        </a:xfrm>
+      </p:grpSpPr>
+      <p:sp>
+        <p:nvSpPr>
+          <p:cNvPr id="161" name="Google Shape;161;p28"/>
+          <p:cNvSpPr txBox="1"/>
+          <p:nvPr>
+            <p:ph type="title"/>
+          </p:nvPr>
+        </p:nvSpPr>
+        <p:spPr>
+          <a:xfrm>
+            <a:off x="311700" y="315925"/>
+            <a:ext cx="8520600" cy="831300"/>
+          </a:xfrm>
+          <a:prstGeom prst="rect">
+            <a:avLst/>
+          </a:prstGeom>
+        </p:spPr>
+        <p:txBody>
+          <a:bodyPr anchorCtr="0" anchor="b" bIns="91425" lIns="91425" spcFirstLastPara="1" rIns="91425" wrap="square" tIns="91425">
+            <a:normAutofit/>
+          </a:bodyPr>
+          <a:lstStyle/>
+          <a:p>
+            <a:pPr indent="0" lvl="0" marL="0" rtl="0" algn="l">
+              <a:spcBef>
+                <a:spcPts val="0"/>
+              </a:spcBef>
+              <a:spcAft>
+                <a:spcPts val="0"/>
+              </a:spcAft>
+              <a:buNone/>
+            </a:pPr>
+            <a:r>
+              <a:rPr lang="es"/>
+              <a:t>Desarrollo | </a:t>
+            </a:r>
+            <a:r>
+              <a:rPr lang="es" sz="2600"/>
+              <a:t>Cambios en el prototipo original</a:t>
+            </a:r>
+            <a:endParaRPr sz="2600"/>
+          </a:p>
+        </p:txBody>
+      </p:sp>
+      <p:sp>
+        <p:nvSpPr>
+          <p:cNvPr id="162" name="Google Shape;162;p28"/>
+          <p:cNvSpPr txBox="1"/>
+          <p:nvPr>
+            <p:ph idx="1" type="body"/>
+          </p:nvPr>
+        </p:nvSpPr>
+        <p:spPr>
+          <a:xfrm>
+            <a:off x="311700" y="1225225"/>
+            <a:ext cx="8520600" cy="3354000"/>
+          </a:xfrm>
+          <a:prstGeom prst="rect">
+            <a:avLst/>
+          </a:prstGeom>
+        </p:spPr>
+        <p:txBody>
+          <a:bodyPr anchorCtr="0" anchor="t" bIns="91425" lIns="91425" spcFirstLastPara="1" rIns="91425" wrap="square" tIns="91425">
+            <a:normAutofit/>
+          </a:bodyPr>
+          <a:lstStyle/>
+          <a:p>
+            <a:pPr indent="0" lvl="0" marL="0" rtl="0" algn="l">
+              <a:spcBef>
+                <a:spcPts val="0"/>
+              </a:spcBef>
+              <a:spcAft>
+                <a:spcPts val="1200"/>
+              </a:spcAft>
+              <a:buNone/>
+            </a:pPr>
+            <a:r>
+              <a:rPr lang="es"/>
+              <a:t>Decidí cambiar el método CalcularDistancia() para que se asemeje a los que encontré en mi investigación del algoritmo.</a:t>
+            </a:r>
+            <a:endParaRPr/>
+          </a:p>
+        </p:txBody>
+      </p:sp>
+      <p:pic>
+        <p:nvPicPr>
+          <p:cNvPr id="163" name="Google Shape;163;p28"/>
+          <p:cNvPicPr preferRelativeResize="0"/>
+          <p:nvPr/>
+        </p:nvPicPr>
+        <p:blipFill>
+          <a:blip r:embed="rId3">
+            <a:alphaModFix/>
+          </a:blip>
+          <a:stretch>
+            <a:fillRect/>
+          </a:stretch>
+        </p:blipFill>
+        <p:spPr>
+          <a:xfrm>
+            <a:off x="152775" y="2017873"/>
+            <a:ext cx="5243000" cy="2854525"/>
+          </a:xfrm>
+          <a:prstGeom prst="rect">
+            <a:avLst/>
+          </a:prstGeom>
+          <a:noFill/>
+          <a:ln>
+            <a:noFill/>
+          </a:ln>
+        </p:spPr>
+      </p:pic>
+      <p:pic>
+        <p:nvPicPr>
+          <p:cNvPr id="164" name="Google Shape;164;p28"/>
+          <p:cNvPicPr preferRelativeResize="0"/>
+          <p:nvPr/>
+        </p:nvPicPr>
+        <p:blipFill>
+          <a:blip r:embed="rId4">
+            <a:alphaModFix/>
+          </a:blip>
+          <a:stretch>
+            <a:fillRect/>
+          </a:stretch>
+        </p:blipFill>
+        <p:spPr>
+          <a:xfrm>
+            <a:off x="4956375" y="2571738"/>
+            <a:ext cx="4095750" cy="866775"/>
+          </a:xfrm>
+          <a:prstGeom prst="rect">
+            <a:avLst/>
+          </a:prstGeom>
+          <a:noFill/>
+          <a:ln>
+            <a:noFill/>
+          </a:ln>
+        </p:spPr>
+      </p:pic>
+      <p:sp>
+        <p:nvSpPr>
+          <p:cNvPr id="165" name="Google Shape;165;p28"/>
+          <p:cNvSpPr/>
+          <p:nvPr/>
+        </p:nvSpPr>
+        <p:spPr>
+          <a:xfrm>
+            <a:off x="3768663" y="2723325"/>
+            <a:ext cx="1187700" cy="715200"/>
+          </a:xfrm>
+          <a:prstGeom prst="stripedRightArrow">
+            <a:avLst>
+              <a:gd fmla="val 50000" name="adj1"/>
+              <a:gd fmla="val 50000" name="adj2"/>
+            </a:avLst>
+          </a:prstGeom>
+          <a:solidFill>
+            <a:schemeClr val="lt2"/>
+          </a:solidFill>
+          <a:ln cap="flat" cmpd="sng" w="9525">
+            <a:solidFill>
+              <a:schemeClr val="dk2"/>
+            </a:solidFill>
+            <a:prstDash val="solid"/>
+            <a:round/>
+            <a:headEnd len="sm" w="sm" type="none"/>
+            <a:tailEnd len="sm" w="sm" type="none"/>
+          </a:ln>
+        </p:spPr>
+        <p:txBody>
+          <a:bodyPr anchorCtr="0" anchor="ctr" bIns="91425" lIns="91425" spcFirstLastPara="1" rIns="91425" wrap="square" tIns="91425">
+            <a:noAutofit/>
+          </a:bodyPr>
+          <a:lstStyle/>
+          <a:p>
+            <a:pPr indent="0" lvl="0" marL="0" rtl="0" algn="ctr">
+              <a:spcBef>
+                <a:spcPts val="0"/>
+              </a:spcBef>
+              <a:spcAft>
+                <a:spcPts val="0"/>
+              </a:spcAft>
+              <a:buNone/>
+            </a:pPr>
+            <a:r>
+              <a:t/>
+            </a:r>
+            <a:endParaRPr/>
+          </a:p>
+        </p:txBody>
+      </p:sp>
+    </p:spTree>
+  </p:cSld>
+  <p:clrMapOvr>
+    <a:masterClrMapping/>
+  </p:clrMapOvr>
+</p:sld>
+</file>
+
+<file path=ppt/slides/slide17.xml><?xml version="1.0" encoding="utf-8"?>
+<p:sld xmlns:a="http://schemas.openxmlformats.org/drawingml/2006/main" xmlns:r="http://schemas.openxmlformats.org/officeDocument/2006/relationships" xmlns:mc="http://schemas.openxmlformats.org/markup-compatibility/2006" xmlns:mv="urn:schemas-microsoft-com:mac:vml" xmlns:p="http://schemas.openxmlformats.org/presentationml/2006/main" xmlns:c="http://schemas.openxmlformats.org/drawingml/2006/chart" xmlns:dgm="http://schemas.openxmlformats.org/drawingml/2006/diagram" xmlns:o="urn:schemas-microsoft-com:office:office" xmlns:v="urn:schemas-microsoft-com:vml" xmlns:pvml="urn:schemas-microsoft-com:office:powerpoint" xmlns:com="http://schemas.openxmlformats.org/drawingml/2006/compatibility" xmlns:p14="http://schemas.microsoft.com/office/powerpoint/2010/main" xmlns:p15="http://schemas.microsoft.com/office/powerpoint/2012/main" xmlns:ahyp="http://schemas.microsoft.com/office/drawing/2018/hyperlinkcolor">
+  <p:cSld>
+    <p:spTree>
+      <p:nvGrpSpPr>
+        <p:cNvPr id="169" name="Shape 169"/>
+        <p:cNvGrpSpPr/>
+        <p:nvPr/>
+      </p:nvGrpSpPr>
+      <p:grpSpPr>
+        <a:xfrm>
+          <a:off x="0" y="0"/>
+          <a:ext cx="0" cy="0"/>
+          <a:chOff x="0" y="0"/>
+          <a:chExt cx="0" cy="0"/>
+        </a:xfrm>
+      </p:grpSpPr>
+      <p:sp>
+        <p:nvSpPr>
+          <p:cNvPr id="170" name="Google Shape;170;p29"/>
+          <p:cNvSpPr txBox="1"/>
+          <p:nvPr>
+            <p:ph type="title"/>
+          </p:nvPr>
+        </p:nvSpPr>
+        <p:spPr>
+          <a:xfrm>
+            <a:off x="311700" y="315925"/>
+            <a:ext cx="8520600" cy="831300"/>
+          </a:xfrm>
+          <a:prstGeom prst="rect">
+            <a:avLst/>
+          </a:prstGeom>
+        </p:spPr>
+        <p:txBody>
+          <a:bodyPr anchorCtr="0" anchor="b" bIns="91425" lIns="91425" spcFirstLastPara="1" rIns="91425" wrap="square" tIns="91425">
+            <a:normAutofit/>
+          </a:bodyPr>
+          <a:lstStyle/>
+          <a:p>
+            <a:pPr indent="0" lvl="0" marL="0" rtl="0" algn="l">
+              <a:spcBef>
+                <a:spcPts val="0"/>
+              </a:spcBef>
+              <a:spcAft>
+                <a:spcPts val="0"/>
+              </a:spcAft>
+              <a:buNone/>
+            </a:pPr>
+            <a:r>
+              <a:rPr lang="es"/>
+              <a:t>Desarrollo | </a:t>
+            </a:r>
+            <a:r>
+              <a:rPr lang="es" sz="2600"/>
+              <a:t>Futuro</a:t>
+            </a:r>
+            <a:endParaRPr/>
+          </a:p>
+        </p:txBody>
+      </p:sp>
+      <p:sp>
+        <p:nvSpPr>
+          <p:cNvPr id="171" name="Google Shape;171;p29"/>
+          <p:cNvSpPr txBox="1"/>
+          <p:nvPr>
+            <p:ph idx="1" type="body"/>
+          </p:nvPr>
+        </p:nvSpPr>
+        <p:spPr>
+          <a:xfrm>
+            <a:off x="311700" y="1225225"/>
+            <a:ext cx="8520600" cy="3354000"/>
+          </a:xfrm>
+          <a:prstGeom prst="rect">
+            <a:avLst/>
+          </a:prstGeom>
+        </p:spPr>
+        <p:txBody>
+          <a:bodyPr anchorCtr="0" anchor="t" bIns="91425" lIns="91425" spcFirstLastPara="1" rIns="91425" wrap="square" tIns="91425">
+            <a:normAutofit/>
+          </a:bodyPr>
+          <a:lstStyle/>
+          <a:p>
+            <a:pPr indent="0" lvl="0" marL="0" rtl="0" algn="l">
+              <a:spcBef>
+                <a:spcPts val="0"/>
+              </a:spcBef>
+              <a:spcAft>
+                <a:spcPts val="1200"/>
+              </a:spcAft>
+              <a:buClr>
+                <a:schemeClr val="dk1"/>
+              </a:buClr>
+              <a:buSzPts val="1100"/>
+              <a:buFont typeface="Arial"/>
+              <a:buNone/>
+            </a:pPr>
+            <a:r>
+              <a:rPr i="1" lang="es"/>
+              <a:t>Esto va cuando se termine por completo</a:t>
+            </a:r>
+            <a:endParaRPr/>
+          </a:p>
+        </p:txBody>
+      </p:sp>
+    </p:spTree>
+  </p:cSld>
+  <p:clrMapOvr>
+    <a:masterClrMapping/>
+  </p:clrMapOvr>
+</p:sld>
+</file>
+
+<file path=ppt/slides/slide18.xml><?xml version="1.0" encoding="utf-8"?>
+<p:sld xmlns:a="http://schemas.openxmlformats.org/drawingml/2006/main" xmlns:r="http://schemas.openxmlformats.org/officeDocument/2006/relationships" xmlns:mc="http://schemas.openxmlformats.org/markup-compatibility/2006" xmlns:mv="urn:schemas-microsoft-com:mac:vml" xmlns:p="http://schemas.openxmlformats.org/presentationml/2006/main" xmlns:c="http://schemas.openxmlformats.org/drawingml/2006/chart" xmlns:dgm="http://schemas.openxmlformats.org/drawingml/2006/diagram" xmlns:o="urn:schemas-microsoft-com:office:office" xmlns:v="urn:schemas-microsoft-com:vml" xmlns:pvml="urn:schemas-microsoft-com:office:powerpoint" xmlns:com="http://schemas.openxmlformats.org/drawingml/2006/compatibility" xmlns:p14="http://schemas.microsoft.com/office/powerpoint/2010/main" xmlns:p15="http://schemas.microsoft.com/office/powerpoint/2012/main" xmlns:ahyp="http://schemas.microsoft.com/office/drawing/2018/hyperlinkcolor">
+  <p:cSld>
+    <p:spTree>
+      <p:nvGrpSpPr>
+        <p:cNvPr id="175" name="Shape 175"/>
+        <p:cNvGrpSpPr/>
+        <p:nvPr/>
+      </p:nvGrpSpPr>
+      <p:grpSpPr>
+        <a:xfrm>
+          <a:off x="0" y="0"/>
+          <a:ext cx="0" cy="0"/>
+          <a:chOff x="0" y="0"/>
+          <a:chExt cx="0" cy="0"/>
+        </a:xfrm>
+      </p:grpSpPr>
+      <p:sp>
+        <p:nvSpPr>
+          <p:cNvPr id="176" name="Google Shape;176;p30"/>
+          <p:cNvSpPr txBox="1"/>
+          <p:nvPr>
+            <p:ph type="title"/>
+          </p:nvPr>
+        </p:nvSpPr>
+        <p:spPr>
+          <a:xfrm>
+            <a:off x="311700" y="315925"/>
+            <a:ext cx="8520600" cy="831300"/>
+          </a:xfrm>
+          <a:prstGeom prst="rect">
+            <a:avLst/>
+          </a:prstGeom>
+        </p:spPr>
+        <p:txBody>
+          <a:bodyPr anchorCtr="0" anchor="b" bIns="91425" lIns="91425" spcFirstLastPara="1" rIns="91425" wrap="square" tIns="91425">
+            <a:normAutofit/>
+          </a:bodyPr>
+          <a:lstStyle/>
+          <a:p>
+            <a:pPr indent="0" lvl="0" marL="0" rtl="0" algn="l">
+              <a:spcBef>
+                <a:spcPts val="0"/>
+              </a:spcBef>
+              <a:spcAft>
+                <a:spcPts val="0"/>
+              </a:spcAft>
+              <a:buNone/>
+            </a:pPr>
+            <a:r>
+              <a:rPr lang="es"/>
+              <a:t>Demostración | </a:t>
+            </a:r>
+            <a:r>
+              <a:rPr lang="es" sz="2600"/>
+              <a:t>Búsqueda simple</a:t>
+            </a:r>
+            <a:endParaRPr/>
+          </a:p>
+        </p:txBody>
+      </p:sp>
+      <p:pic>
+        <p:nvPicPr>
+          <p:cNvPr id="177" name="Google Shape;177;p30" title="buscar.gif"/>
+          <p:cNvPicPr preferRelativeResize="0"/>
+          <p:nvPr/>
+        </p:nvPicPr>
+        <p:blipFill>
+          <a:blip r:embed="rId3">
+            <a:alphaModFix/>
+          </a:blip>
+          <a:stretch>
+            <a:fillRect/>
+          </a:stretch>
+        </p:blipFill>
+        <p:spPr>
+          <a:xfrm>
+            <a:off x="1290688" y="1147225"/>
+            <a:ext cx="6562621" cy="3691474"/>
+          </a:xfrm>
+          <a:prstGeom prst="rect">
+            <a:avLst/>
+          </a:prstGeom>
+          <a:noFill/>
+          <a:ln>
+            <a:noFill/>
+          </a:ln>
+        </p:spPr>
+      </p:pic>
+    </p:spTree>
+  </p:cSld>
+  <p:clrMapOvr>
+    <a:masterClrMapping/>
+  </p:clrMapOvr>
+</p:sld>
+</file>
+
+<file path=ppt/slides/slide19.xml><?xml version="1.0" encoding="utf-8"?>
+<p:sld xmlns:a="http://schemas.openxmlformats.org/drawingml/2006/main" xmlns:r="http://schemas.openxmlformats.org/officeDocument/2006/relationships" xmlns:mc="http://schemas.openxmlformats.org/markup-compatibility/2006" xmlns:mv="urn:schemas-microsoft-com:mac:vml" xmlns:p="http://schemas.openxmlformats.org/presentationml/2006/main" xmlns:c="http://schemas.openxmlformats.org/drawingml/2006/chart" xmlns:dgm="http://schemas.openxmlformats.org/drawingml/2006/diagram" xmlns:o="urn:schemas-microsoft-com:office:office" xmlns:v="urn:schemas-microsoft-com:vml" xmlns:pvml="urn:schemas-microsoft-com:office:powerpoint" xmlns:com="http://schemas.openxmlformats.org/drawingml/2006/compatibility" xmlns:p14="http://schemas.microsoft.com/office/powerpoint/2010/main" xmlns:p15="http://schemas.microsoft.com/office/powerpoint/2012/main" xmlns:ahyp="http://schemas.microsoft.com/office/drawing/2018/hyperlinkcolor">
+  <p:cSld>
+    <p:spTree>
+      <p:nvGrpSpPr>
+        <p:cNvPr id="181" name="Shape 181"/>
+        <p:cNvGrpSpPr/>
+        <p:nvPr/>
+      </p:nvGrpSpPr>
+      <p:grpSpPr>
+        <a:xfrm>
+          <a:off x="0" y="0"/>
+          <a:ext cx="0" cy="0"/>
+          <a:chOff x="0" y="0"/>
+          <a:chExt cx="0" cy="0"/>
+        </a:xfrm>
+      </p:grpSpPr>
+      <p:sp>
+        <p:nvSpPr>
+          <p:cNvPr id="182" name="Google Shape;182;p31"/>
+          <p:cNvSpPr txBox="1"/>
+          <p:nvPr>
+            <p:ph type="title"/>
+          </p:nvPr>
+        </p:nvSpPr>
+        <p:spPr>
+          <a:xfrm>
+            <a:off x="311700" y="315925"/>
+            <a:ext cx="8520600" cy="831300"/>
+          </a:xfrm>
+          <a:prstGeom prst="rect">
+            <a:avLst/>
+          </a:prstGeom>
+        </p:spPr>
+        <p:txBody>
+          <a:bodyPr anchorCtr="0" anchor="b" bIns="91425" lIns="91425" spcFirstLastPara="1" rIns="91425" wrap="square" tIns="91425">
+            <a:normAutofit/>
+          </a:bodyPr>
+          <a:lstStyle/>
+          <a:p>
+            <a:pPr indent="0" lvl="0" marL="0" rtl="0" algn="l">
+              <a:spcBef>
+                <a:spcPts val="0"/>
+              </a:spcBef>
+              <a:spcAft>
+                <a:spcPts val="0"/>
+              </a:spcAft>
+              <a:buNone/>
+            </a:pPr>
+            <a:r>
+              <a:rPr lang="es"/>
+              <a:t>Reflexiones</a:t>
+            </a:r>
+            <a:endParaRPr/>
+          </a:p>
+        </p:txBody>
+      </p:sp>
+      <p:sp>
+        <p:nvSpPr>
+          <p:cNvPr id="183" name="Google Shape;183;p31"/>
+          <p:cNvSpPr txBox="1"/>
+          <p:nvPr>
+            <p:ph idx="1" type="body"/>
+          </p:nvPr>
+        </p:nvSpPr>
+        <p:spPr>
+          <a:xfrm>
+            <a:off x="311700" y="1225225"/>
+            <a:ext cx="8520600" cy="3354000"/>
+          </a:xfrm>
+          <a:prstGeom prst="rect">
+            <a:avLst/>
+          </a:prstGeom>
+        </p:spPr>
+        <p:txBody>
+          <a:bodyPr anchorCtr="0" anchor="t" bIns="91425" lIns="91425" spcFirstLastPara="1" rIns="91425" wrap="square" tIns="91425">
+            <a:normAutofit/>
+          </a:bodyPr>
+          <a:lstStyle/>
+          <a:p>
+            <a:pPr indent="0" lvl="0" marL="0" rtl="0" algn="l">
+              <a:spcBef>
+                <a:spcPts val="0"/>
+              </a:spcBef>
+              <a:spcAft>
+                <a:spcPts val="0"/>
+              </a:spcAft>
+              <a:buNone/>
+            </a:pPr>
+            <a:r>
+              <a:rPr lang="es"/>
+              <a:t>Durante la realización del trabajo aprendí:</a:t>
+            </a:r>
+            <a:endParaRPr/>
+          </a:p>
+          <a:p>
+            <a:pPr indent="-342900" lvl="0" marL="457200" rtl="0" algn="l">
+              <a:spcBef>
+                <a:spcPts val="1200"/>
+              </a:spcBef>
+              <a:spcAft>
+                <a:spcPts val="0"/>
+              </a:spcAft>
+              <a:buSzPts val="1800"/>
+              <a:buChar char="-"/>
+            </a:pPr>
+            <a:r>
+              <a:rPr lang="es"/>
+              <a:t>Árboles BK (</a:t>
+            </a:r>
+            <a:r>
+              <a:rPr lang="es"/>
+              <a:t>Burkhard-Keller tree)</a:t>
+            </a:r>
+            <a:endParaRPr/>
+          </a:p>
+          <a:p>
+            <a:pPr indent="-342900" lvl="0" marL="457200" rtl="0" algn="l">
+              <a:spcBef>
+                <a:spcPts val="0"/>
+              </a:spcBef>
+              <a:spcAft>
+                <a:spcPts val="0"/>
+              </a:spcAft>
+              <a:buSzPts val="1800"/>
+              <a:buChar char="-"/>
+            </a:pPr>
+            <a:r>
+              <a:rPr lang="es"/>
+              <a:t>Árboles generales en C#</a:t>
+            </a:r>
+            <a:endParaRPr/>
+          </a:p>
+          <a:p>
+            <a:pPr indent="-342900" lvl="0" marL="457200" rtl="0" algn="l">
+              <a:spcBef>
+                <a:spcPts val="0"/>
+              </a:spcBef>
+              <a:spcAft>
+                <a:spcPts val="0"/>
+              </a:spcAft>
+              <a:buSzPts val="1800"/>
+              <a:buChar char="-"/>
+            </a:pPr>
+            <a:r>
+              <a:rPr lang="es"/>
+              <a:t>Recorrido de árboles</a:t>
+            </a:r>
+            <a:endParaRPr/>
+          </a:p>
+          <a:p>
+            <a:pPr indent="-342900" lvl="0" marL="457200" rtl="0" algn="l">
+              <a:spcBef>
+                <a:spcPts val="0"/>
+              </a:spcBef>
+              <a:spcAft>
+                <a:spcPts val="0"/>
+              </a:spcAft>
+              <a:buSzPts val="1800"/>
+              <a:buChar char="-"/>
+            </a:pPr>
+            <a:r>
+              <a:rPr lang="es"/>
+              <a:t>Recursión</a:t>
+            </a:r>
+            <a:endParaRPr/>
+          </a:p>
+          <a:p>
+            <a:pPr indent="-342900" lvl="0" marL="457200" rtl="0" algn="l">
+              <a:spcBef>
+                <a:spcPts val="0"/>
+              </a:spcBef>
+              <a:spcAft>
+                <a:spcPts val="0"/>
+              </a:spcAft>
+              <a:buSzPts val="1800"/>
+              <a:buChar char="-"/>
+            </a:pPr>
+            <a:r>
+              <a:rPr lang="es"/>
+              <a:t>Tipos de datos genéricos</a:t>
             </a:r>
             <a:endParaRPr/>
           </a:p>
@@ -8488,6 +9778,71 @@
             </a:pPr>
             <a:r>
               <a:t/>
+            </a:r>
+            <a:endParaRPr/>
+          </a:p>
+        </p:txBody>
+      </p:sp>
+    </p:spTree>
+  </p:cSld>
+  <p:clrMapOvr>
+    <a:masterClrMapping/>
+  </p:clrMapOvr>
+</p:sld>
+</file>
+
+<file path=ppt/slides/slide20.xml><?xml version="1.0" encoding="utf-8"?>
+<p:sld xmlns:a="http://schemas.openxmlformats.org/drawingml/2006/main" xmlns:r="http://schemas.openxmlformats.org/officeDocument/2006/relationships" xmlns:mc="http://schemas.openxmlformats.org/markup-compatibility/2006" xmlns:mv="urn:schemas-microsoft-com:mac:vml" xmlns:p="http://schemas.openxmlformats.org/presentationml/2006/main" xmlns:c="http://schemas.openxmlformats.org/drawingml/2006/chart" xmlns:dgm="http://schemas.openxmlformats.org/drawingml/2006/diagram" xmlns:o="urn:schemas-microsoft-com:office:office" xmlns:v="urn:schemas-microsoft-com:vml" xmlns:pvml="urn:schemas-microsoft-com:office:powerpoint" xmlns:com="http://schemas.openxmlformats.org/drawingml/2006/compatibility" xmlns:p14="http://schemas.microsoft.com/office/powerpoint/2010/main" xmlns:p15="http://schemas.microsoft.com/office/powerpoint/2012/main" xmlns:ahyp="http://schemas.microsoft.com/office/drawing/2018/hyperlinkcolor">
+  <p:cSld>
+    <p:spTree>
+      <p:nvGrpSpPr>
+        <p:cNvPr id="187" name="Shape 187"/>
+        <p:cNvGrpSpPr/>
+        <p:nvPr/>
+      </p:nvGrpSpPr>
+      <p:grpSpPr>
+        <a:xfrm>
+          <a:off x="0" y="0"/>
+          <a:ext cx="0" cy="0"/>
+          <a:chOff x="0" y="0"/>
+          <a:chExt cx="0" cy="0"/>
+        </a:xfrm>
+      </p:grpSpPr>
+      <p:sp>
+        <p:nvSpPr>
+          <p:cNvPr id="188" name="Google Shape;188;p32"/>
+          <p:cNvSpPr txBox="1"/>
+          <p:nvPr>
+            <p:ph type="ctrTitle"/>
+          </p:nvPr>
+        </p:nvSpPr>
+        <p:spPr>
+          <a:xfrm>
+            <a:off x="3044700" y="1736355"/>
+            <a:ext cx="3054600" cy="1537200"/>
+          </a:xfrm>
+          <a:prstGeom prst="rect">
+            <a:avLst/>
+          </a:prstGeom>
+        </p:spPr>
+        <p:txBody>
+          <a:bodyPr anchorCtr="0" anchor="b" bIns="91425" lIns="91425" spcFirstLastPara="1" rIns="91425" wrap="square" tIns="91425">
+            <a:normAutofit/>
+          </a:bodyPr>
+          <a:lstStyle/>
+          <a:p>
+            <a:pPr indent="0" lvl="0" marL="0" rtl="0" algn="ctr">
+              <a:spcBef>
+                <a:spcPts val="0"/>
+              </a:spcBef>
+              <a:spcAft>
+                <a:spcPts val="0"/>
+              </a:spcAft>
+              <a:buNone/>
+            </a:pPr>
+            <a:r>
+              <a:rPr lang="es"/>
+              <a:t>¡Muchas gracias por su atención!</a:t>
             </a:r>
             <a:endParaRPr/>
           </a:p>
@@ -8725,7 +10080,7 @@
             </a:pPr>
             <a:r>
               <a:rPr lang="es"/>
-              <a:t>Éste tipo de árboles </a:t>
+              <a:t>Éste tipo de árboles se pueden usar en </a:t>
             </a:r>
             <a:r>
               <a:rPr lang="es"/>
@@ -8848,8 +10203,8 @@
         </p:blipFill>
         <p:spPr>
           <a:xfrm>
-            <a:off x="2778125" y="1422747"/>
-            <a:ext cx="3587750" cy="3411200"/>
+            <a:off x="2521275" y="1147225"/>
+            <a:ext cx="4062600" cy="3862675"/>
           </a:xfrm>
           <a:prstGeom prst="rect">
             <a:avLst/>
@@ -8923,51 +10278,40 @@
             </a:r>
             <a:r>
               <a:rPr lang="es" sz="2600"/>
-              <a:t>Implementación</a:t>
+              <a:t>Software de versiones</a:t>
             </a:r>
-            <a:endParaRPr/>
+            <a:endParaRPr sz="2600"/>
           </a:p>
         </p:txBody>
       </p:sp>
-      <p:sp>
-        <p:nvSpPr>
+      <p:pic>
+        <p:nvPicPr>
           <p:cNvPr id="98" name="Google Shape;98;p18"/>
-          <p:cNvSpPr txBox="1"/>
-          <p:nvPr>
-            <p:ph idx="1" type="body"/>
-          </p:nvPr>
-        </p:nvSpPr>
-        <p:spPr>
-          <a:xfrm>
-            <a:off x="311700" y="1225225"/>
-            <a:ext cx="8520600" cy="3354000"/>
+          <p:cNvPicPr preferRelativeResize="0"/>
+          <p:nvPr/>
+        </p:nvPicPr>
+        <p:blipFill>
+          <a:blip r:embed="rId3">
+            <a:alphaModFix/>
+          </a:blip>
+          <a:stretch>
+            <a:fillRect/>
+          </a:stretch>
+        </p:blipFill>
+        <p:spPr>
+          <a:xfrm>
+            <a:off x="532163" y="1261425"/>
+            <a:ext cx="8079684" cy="3691474"/>
           </a:xfrm>
           <a:prstGeom prst="rect">
             <a:avLst/>
           </a:prstGeom>
-        </p:spPr>
-        <p:txBody>
-          <a:bodyPr anchorCtr="0" anchor="t" bIns="91425" lIns="91425" spcFirstLastPara="1" rIns="91425" wrap="square" tIns="91425">
-            <a:normAutofit/>
-          </a:bodyPr>
-          <a:lstStyle/>
-          <a:p>
-            <a:pPr indent="0" lvl="0" marL="0" rtl="0" algn="l">
-              <a:spcBef>
-                <a:spcPts val="0"/>
-              </a:spcBef>
-              <a:spcAft>
-                <a:spcPts val="1200"/>
-              </a:spcAft>
-              <a:buNone/>
-            </a:pPr>
-            <a:r>
-              <a:t/>
-            </a:r>
-            <a:endParaRPr/>
-          </a:p>
-        </p:txBody>
-      </p:sp>
+          <a:noFill/>
+          <a:ln>
+            <a:noFill/>
+          </a:ln>
+        </p:spPr>
+      </p:pic>
     </p:spTree>
   </p:cSld>
   <p:clrMapOvr>
@@ -9037,49 +10381,9 @@
           </a:p>
         </p:txBody>
       </p:sp>
-      <p:sp>
-        <p:nvSpPr>
-          <p:cNvPr id="104" name="Google Shape;104;p19"/>
-          <p:cNvSpPr txBox="1"/>
-          <p:nvPr>
-            <p:ph idx="1" type="body"/>
-          </p:nvPr>
-        </p:nvSpPr>
-        <p:spPr>
-          <a:xfrm>
-            <a:off x="311700" y="1225225"/>
-            <a:ext cx="8520600" cy="3354000"/>
-          </a:xfrm>
-          <a:prstGeom prst="rect">
-            <a:avLst/>
-          </a:prstGeom>
-        </p:spPr>
-        <p:txBody>
-          <a:bodyPr anchorCtr="0" anchor="t" bIns="91425" lIns="91425" spcFirstLastPara="1" rIns="91425" wrap="square" tIns="91425">
-            <a:normAutofit/>
-          </a:bodyPr>
-          <a:lstStyle/>
-          <a:p>
-            <a:pPr indent="0" lvl="0" marL="0" rtl="0" algn="l">
-              <a:spcBef>
-                <a:spcPts val="0"/>
-              </a:spcBef>
-              <a:spcAft>
-                <a:spcPts val="1200"/>
-              </a:spcAft>
-              <a:buNone/>
-            </a:pPr>
-            <a:r>
-              <a:rPr lang="es"/>
-              <a:t>Calculamos distancia y verificamos si hay hijos con esa distancia</a:t>
-            </a:r>
-            <a:endParaRPr/>
-          </a:p>
-        </p:txBody>
-      </p:sp>
       <p:pic>
         <p:nvPicPr>
-          <p:cNvPr id="105" name="Google Shape;105;p19"/>
+          <p:cNvPr id="104" name="Google Shape;104;p19" title="Agregar.png"/>
           <p:cNvPicPr preferRelativeResize="0"/>
           <p:nvPr/>
         </p:nvPicPr>
@@ -9093,8 +10397,8 @@
         </p:blipFill>
         <p:spPr>
           <a:xfrm>
-            <a:off x="2064838" y="1745428"/>
-            <a:ext cx="5014337" cy="2833800"/>
+            <a:off x="1464988" y="1047025"/>
+            <a:ext cx="6214026" cy="3879375"/>
           </a:xfrm>
           <a:prstGeom prst="rect">
             <a:avLst/>
@@ -9118,7 +10422,7 @@
   <p:cSld>
     <p:spTree>
       <p:nvGrpSpPr>
-        <p:cNvPr id="109" name="Shape 109"/>
+        <p:cNvPr id="108" name="Shape 108"/>
         <p:cNvGrpSpPr/>
         <p:nvPr/>
       </p:nvGrpSpPr>
@@ -9132,7 +10436,7 @@
       </p:grpSpPr>
       <p:sp>
         <p:nvSpPr>
-          <p:cNvPr id="110" name="Google Shape;110;p20"/>
+          <p:cNvPr id="109" name="Google Shape;109;p20"/>
           <p:cNvSpPr txBox="1"/>
           <p:nvPr>
             <p:ph type="title"/>
@@ -9176,7 +10480,7 @@
       </p:sp>
       <p:sp>
         <p:nvSpPr>
-          <p:cNvPr id="111" name="Google Shape;111;p20"/>
+          <p:cNvPr id="110" name="Google Shape;110;p20"/>
           <p:cNvSpPr txBox="1"/>
           <p:nvPr>
             <p:ph idx="1" type="body"/>
@@ -9208,7 +10512,7 @@
             </a:pPr>
             <a:r>
               <a:rPr lang="es"/>
-              <a:t>Si se encontró hijo con esa distancia agrego el dato en ese hijo o sus hijos (recursivamente), si no se encontró agrego el dato como hijo.</a:t>
+              <a:t>Calculamos distancia y verificamos si hay hijos con esa distancia</a:t>
             </a:r>
             <a:endParaRPr/>
           </a:p>
@@ -9216,7 +10520,7 @@
       </p:sp>
       <p:pic>
         <p:nvPicPr>
-          <p:cNvPr id="112" name="Google Shape;112;p20"/>
+          <p:cNvPr id="111" name="Google Shape;111;p20"/>
           <p:cNvPicPr preferRelativeResize="0"/>
           <p:nvPr/>
         </p:nvPicPr>
@@ -9230,8 +10534,8 @@
         </p:blipFill>
         <p:spPr>
           <a:xfrm>
-            <a:off x="1295400" y="2157413"/>
-            <a:ext cx="6172200" cy="2276475"/>
+            <a:off x="2064838" y="1745428"/>
+            <a:ext cx="5014337" cy="2833800"/>
           </a:xfrm>
           <a:prstGeom prst="rect">
             <a:avLst/>
@@ -9255,7 +10559,7 @@
   <p:cSld>
     <p:spTree>
       <p:nvGrpSpPr>
-        <p:cNvPr id="116" name="Shape 116"/>
+        <p:cNvPr id="115" name="Shape 115"/>
         <p:cNvGrpSpPr/>
         <p:nvPr/>
       </p:nvGrpSpPr>
@@ -9269,7 +10573,7 @@
       </p:grpSpPr>
       <p:sp>
         <p:nvSpPr>
-          <p:cNvPr id="117" name="Google Shape;117;p21"/>
+          <p:cNvPr id="116" name="Google Shape;116;p21"/>
           <p:cNvSpPr txBox="1"/>
           <p:nvPr>
             <p:ph type="title"/>
@@ -9313,7 +10617,7 @@
       </p:sp>
       <p:sp>
         <p:nvSpPr>
-          <p:cNvPr id="118" name="Google Shape;118;p21"/>
+          <p:cNvPr id="117" name="Google Shape;117;p21"/>
           <p:cNvSpPr txBox="1"/>
           <p:nvPr>
             <p:ph idx="1" type="body"/>
@@ -9345,7 +10649,7 @@
             </a:pPr>
             <a:r>
               <a:rPr lang="es"/>
-              <a:t>Calculamos la distancia de cada nodo recursivamente. si el dato es menor al umbral se agrega a collected.</a:t>
+              <a:t>Si se encontró hijo con esa distancia agrego el dato en ese hijo o sus hijos (recursivamente), si no se encontró agrego el dato como hijo.</a:t>
             </a:r>
             <a:endParaRPr/>
           </a:p>
@@ -9353,21 +10657,22 @@
       </p:sp>
       <p:pic>
         <p:nvPicPr>
-          <p:cNvPr id="119" name="Google Shape;119;p21"/>
+          <p:cNvPr id="118" name="Google Shape;118;p21"/>
           <p:cNvPicPr preferRelativeResize="0"/>
           <p:nvPr/>
         </p:nvPicPr>
-        <p:blipFill rotWithShape="1">
+        <p:blipFill>
           <a:blip r:embed="rId3">
             <a:alphaModFix/>
           </a:blip>
-          <a:srcRect b="62908" l="0" r="0" t="0"/>
-          <a:stretch/>
+          <a:stretch>
+            <a:fillRect/>
+          </a:stretch>
         </p:blipFill>
         <p:spPr>
           <a:xfrm>
-            <a:off x="470300" y="2317750"/>
-            <a:ext cx="8203425" cy="1930399"/>
+            <a:off x="1295400" y="2157413"/>
+            <a:ext cx="6172200" cy="2276475"/>
           </a:xfrm>
           <a:prstGeom prst="rect">
             <a:avLst/>

</xml_diff>